<commit_message>
changed final pdf presentation week 13
</commit_message>
<xml_diff>
--- a/Week_13/Final_Report_1.pptx
+++ b/Week_13/Final_Report_1.pptx
@@ -7,12 +7,16 @@
   <p:sldIdLst>
     <p:sldId id="256" r:id="rId2"/>
     <p:sldId id="267" r:id="rId3"/>
-    <p:sldId id="268" r:id="rId4"/>
-    <p:sldId id="269" r:id="rId5"/>
-    <p:sldId id="270" r:id="rId6"/>
-    <p:sldId id="271" r:id="rId7"/>
-    <p:sldId id="272" r:id="rId8"/>
-    <p:sldId id="273" r:id="rId9"/>
+    <p:sldId id="275" r:id="rId4"/>
+    <p:sldId id="276" r:id="rId5"/>
+    <p:sldId id="277" r:id="rId6"/>
+    <p:sldId id="274" r:id="rId7"/>
+    <p:sldId id="268" r:id="rId8"/>
+    <p:sldId id="269" r:id="rId9"/>
+    <p:sldId id="270" r:id="rId10"/>
+    <p:sldId id="271" r:id="rId11"/>
+    <p:sldId id="272" r:id="rId12"/>
+    <p:sldId id="273" r:id="rId13"/>
   </p:sldIdLst>
   <p:sldSz cx="12192000" cy="6858000"/>
   <p:notesSz cx="6858000" cy="9144000"/>
@@ -250,7 +254,7 @@
           <a:p>
             <a:fld id="{C764DE79-268F-4C1A-8933-263129D2AF90}" type="datetimeFigureOut">
               <a:rPr lang="en-US" dirty="0"/>
-              <a:t>11/24/2021</a:t>
+              <a:t>11/25/2021</a:t>
             </a:fld>
             <a:endParaRPr lang="en-US"/>
           </a:p>
@@ -420,7 +424,7 @@
           <a:p>
             <a:fld id="{C764DE79-268F-4C1A-8933-263129D2AF90}" type="datetimeFigureOut">
               <a:rPr lang="en-US" dirty="0"/>
-              <a:t>11/24/2021</a:t>
+              <a:t>11/25/2021</a:t>
             </a:fld>
             <a:endParaRPr lang="en-US"/>
           </a:p>
@@ -600,7 +604,7 @@
           <a:p>
             <a:fld id="{C764DE79-268F-4C1A-8933-263129D2AF90}" type="datetimeFigureOut">
               <a:rPr lang="en-US" dirty="0"/>
-              <a:t>11/24/2021</a:t>
+              <a:t>11/25/2021</a:t>
             </a:fld>
             <a:endParaRPr lang="en-US"/>
           </a:p>
@@ -770,7 +774,7 @@
           <a:p>
             <a:fld id="{C764DE79-268F-4C1A-8933-263129D2AF90}" type="datetimeFigureOut">
               <a:rPr lang="en-US" dirty="0"/>
-              <a:t>11/24/2021</a:t>
+              <a:t>11/25/2021</a:t>
             </a:fld>
             <a:endParaRPr lang="en-US"/>
           </a:p>
@@ -1016,7 +1020,7 @@
           <a:p>
             <a:fld id="{C764DE79-268F-4C1A-8933-263129D2AF90}" type="datetimeFigureOut">
               <a:rPr lang="en-US" dirty="0"/>
-              <a:t>11/24/2021</a:t>
+              <a:t>11/25/2021</a:t>
             </a:fld>
             <a:endParaRPr lang="en-US"/>
           </a:p>
@@ -1248,7 +1252,7 @@
           <a:p>
             <a:fld id="{C764DE79-268F-4C1A-8933-263129D2AF90}" type="datetimeFigureOut">
               <a:rPr lang="en-US" dirty="0"/>
-              <a:t>11/24/2021</a:t>
+              <a:t>11/25/2021</a:t>
             </a:fld>
             <a:endParaRPr lang="en-US"/>
           </a:p>
@@ -1615,7 +1619,7 @@
           <a:p>
             <a:fld id="{C764DE79-268F-4C1A-8933-263129D2AF90}" type="datetimeFigureOut">
               <a:rPr lang="en-US" dirty="0"/>
-              <a:t>11/24/2021</a:t>
+              <a:t>11/25/2021</a:t>
             </a:fld>
             <a:endParaRPr lang="en-US"/>
           </a:p>
@@ -1733,7 +1737,7 @@
           <a:p>
             <a:fld id="{C764DE79-268F-4C1A-8933-263129D2AF90}" type="datetimeFigureOut">
               <a:rPr lang="en-US" dirty="0"/>
-              <a:t>11/24/2021</a:t>
+              <a:t>11/25/2021</a:t>
             </a:fld>
             <a:endParaRPr lang="en-US"/>
           </a:p>
@@ -1828,7 +1832,7 @@
           <a:p>
             <a:fld id="{C764DE79-268F-4C1A-8933-263129D2AF90}" type="datetimeFigureOut">
               <a:rPr lang="en-US" dirty="0"/>
-              <a:t>11/24/2021</a:t>
+              <a:t>11/25/2021</a:t>
             </a:fld>
             <a:endParaRPr lang="en-US"/>
           </a:p>
@@ -2105,7 +2109,7 @@
           <a:p>
             <a:fld id="{C764DE79-268F-4C1A-8933-263129D2AF90}" type="datetimeFigureOut">
               <a:rPr lang="en-US" dirty="0"/>
-              <a:t>11/24/2021</a:t>
+              <a:t>11/25/2021</a:t>
             </a:fld>
             <a:endParaRPr lang="en-US"/>
           </a:p>
@@ -2362,7 +2366,7 @@
           <a:p>
             <a:fld id="{C764DE79-268F-4C1A-8933-263129D2AF90}" type="datetimeFigureOut">
               <a:rPr lang="en-US" dirty="0"/>
-              <a:t>11/24/2021</a:t>
+              <a:t>11/25/2021</a:t>
             </a:fld>
             <a:endParaRPr lang="en-US"/>
           </a:p>
@@ -2575,7 +2579,7 @@
           <a:p>
             <a:fld id="{C764DE79-268F-4C1A-8933-263129D2AF90}" type="datetimeFigureOut">
               <a:rPr lang="en-US" dirty="0"/>
-              <a:t>11/24/2021</a:t>
+              <a:t>11/25/2021</a:t>
             </a:fld>
             <a:endParaRPr lang="en-US"/>
           </a:p>
@@ -3039,7 +3043,7 @@
         <p:spPr>
           <a:xfrm>
             <a:off x="870857" y="2380343"/>
-            <a:ext cx="6957674" cy="2769989"/>
+            <a:ext cx="6957674" cy="3385542"/>
           </a:xfrm>
           <a:prstGeom prst="rect">
             <a:avLst/>
@@ -3090,6 +3094,29 @@
             </a:r>
           </a:p>
           <a:p>
+            <a:r>
+              <a:rPr lang="en-US" sz="4000" dirty="0">
+                <a:solidFill>
+                  <a:schemeClr val="bg1"/>
+                </a:solidFill>
+              </a:rPr>
+              <a:t>Group name: Jun and </a:t>
+            </a:r>
+            <a:r>
+              <a:rPr lang="en-US" sz="4000">
+                <a:solidFill>
+                  <a:schemeClr val="bg1"/>
+                </a:solidFill>
+              </a:rPr>
+              <a:t>Esraa</a:t>
+            </a:r>
+            <a:endParaRPr lang="en-US" sz="4000" dirty="0">
+              <a:solidFill>
+                <a:schemeClr val="bg1"/>
+              </a:solidFill>
+            </a:endParaRPr>
+          </a:p>
+          <a:p>
             <a:endParaRPr lang="en-US" sz="4000" dirty="0">
               <a:solidFill>
                 <a:schemeClr val="bg1"/>
@@ -3112,6 +3139,1253 @@
     <p:extLst>
       <p:ext uri="{BB962C8B-B14F-4D97-AF65-F5344CB8AC3E}">
         <p14:creationId xmlns:p14="http://schemas.microsoft.com/office/powerpoint/2010/main" val="109857222"/>
+      </p:ext>
+    </p:extLst>
+  </p:cSld>
+  <p:clrMapOvr>
+    <a:masterClrMapping/>
+  </p:clrMapOvr>
+</p:sld>
+</file>
+
+<file path=ppt/slides/slide10.xml><?xml version="1.0" encoding="utf-8"?>
+<p:sld xmlns:a="http://schemas.openxmlformats.org/drawingml/2006/main" xmlns:r="http://schemas.openxmlformats.org/officeDocument/2006/relationships" xmlns:p="http://schemas.openxmlformats.org/presentationml/2006/main">
+  <p:cSld>
+    <p:spTree>
+      <p:nvGrpSpPr>
+        <p:cNvPr id="1" name=""/>
+        <p:cNvGrpSpPr/>
+        <p:nvPr/>
+      </p:nvGrpSpPr>
+      <p:grpSpPr>
+        <a:xfrm>
+          <a:off x="0" y="0"/>
+          <a:ext cx="0" cy="0"/>
+          <a:chOff x="0" y="0"/>
+          <a:chExt cx="0" cy="0"/>
+        </a:xfrm>
+      </p:grpSpPr>
+      <p:sp>
+        <p:nvSpPr>
+          <p:cNvPr id="2" name="Title 1">
+            <a:extLst>
+              <a:ext uri="{FF2B5EF4-FFF2-40B4-BE49-F238E27FC236}">
+                <a16:creationId xmlns:a16="http://schemas.microsoft.com/office/drawing/2014/main" id="{E8B8F26E-9345-4747-9094-972E38700A17}"/>
+              </a:ext>
+            </a:extLst>
+          </p:cNvPr>
+          <p:cNvSpPr>
+            <a:spLocks noGrp="1"/>
+          </p:cNvSpPr>
+          <p:nvPr>
+            <p:ph type="ctrTitle"/>
+          </p:nvPr>
+        </p:nvSpPr>
+        <p:spPr>
+          <a:xfrm rot="5400000">
+            <a:off x="-562431" y="562430"/>
+            <a:ext cx="6858002" cy="5733142"/>
+          </a:xfrm>
+          <a:solidFill>
+            <a:srgbClr val="3B3B3B"/>
+          </a:solidFill>
+        </p:spPr>
+        <p:txBody>
+          <a:bodyPr vert="vert270" anchor="t" anchorCtr="0"/>
+          <a:lstStyle/>
+          <a:p>
+            <a:r>
+              <a:rPr lang="en-US" b="1" dirty="0">
+                <a:solidFill>
+                  <a:srgbClr val="FF6600"/>
+                </a:solidFill>
+              </a:rPr>
+              <a:t>Pretraining Stage</a:t>
+            </a:r>
+          </a:p>
+        </p:txBody>
+      </p:sp>
+      <p:pic>
+        <p:nvPicPr>
+          <p:cNvPr id="4" name="Picture 3">
+            <a:extLst>
+              <a:ext uri="{FF2B5EF4-FFF2-40B4-BE49-F238E27FC236}">
+                <a16:creationId xmlns:a16="http://schemas.microsoft.com/office/drawing/2014/main" id="{7A465064-0714-5743-882B-8875105A7023}"/>
+              </a:ext>
+            </a:extLst>
+          </p:cNvPr>
+          <p:cNvPicPr>
+            <a:picLocks noChangeAspect="1"/>
+          </p:cNvPicPr>
+          <p:nvPr/>
+        </p:nvPicPr>
+        <p:blipFill>
+          <a:blip r:embed="rId2" cstate="print">
+            <a:extLst>
+              <a:ext uri="{28A0092B-C50C-407E-A947-70E740481C1C}">
+                <a14:useLocalDpi xmlns:a14="http://schemas.microsoft.com/office/drawing/2010/main" val="0"/>
+              </a:ext>
+            </a:extLst>
+          </a:blip>
+          <a:stretch>
+            <a:fillRect/>
+          </a:stretch>
+        </p:blipFill>
+        <p:spPr>
+          <a:xfrm>
+            <a:off x="0" y="5863771"/>
+            <a:ext cx="1654627" cy="994232"/>
+          </a:xfrm>
+          <a:prstGeom prst="rect">
+            <a:avLst/>
+          </a:prstGeom>
+        </p:spPr>
+      </p:pic>
+      <p:sp>
+        <p:nvSpPr>
+          <p:cNvPr id="6" name="Subtitle 5">
+            <a:extLst>
+              <a:ext uri="{FF2B5EF4-FFF2-40B4-BE49-F238E27FC236}">
+                <a16:creationId xmlns:a16="http://schemas.microsoft.com/office/drawing/2014/main" id="{2D4BA697-580E-5544-8F2F-194AD99B859F}"/>
+              </a:ext>
+            </a:extLst>
+          </p:cNvPr>
+          <p:cNvSpPr>
+            <a:spLocks noGrp="1"/>
+          </p:cNvSpPr>
+          <p:nvPr>
+            <p:ph type="subTitle" idx="1"/>
+          </p:nvPr>
+        </p:nvSpPr>
+        <p:spPr>
+          <a:xfrm>
+            <a:off x="5837274" y="0"/>
+            <a:ext cx="6354726" cy="6858000"/>
+          </a:xfrm>
+        </p:spPr>
+        <p:txBody>
+          <a:bodyPr>
+            <a:noAutofit/>
+          </a:bodyPr>
+          <a:lstStyle/>
+          <a:p>
+            <a:pPr marL="857250" indent="-857250" algn="l">
+              <a:buFont typeface="Arial" panose="020B0604020202020204" pitchFamily="34" charset="0"/>
+              <a:buChar char="•"/>
+            </a:pPr>
+            <a:r>
+              <a:rPr lang="fr-FR" dirty="0"/>
+              <a:t>Train a few </a:t>
+            </a:r>
+            <a:r>
+              <a:rPr lang="fr-FR" dirty="0" err="1"/>
+              <a:t>epoch</a:t>
+            </a:r>
+            <a:r>
+              <a:rPr lang="fr-FR" dirty="0"/>
+              <a:t>. </a:t>
+            </a:r>
+            <a:r>
+              <a:rPr lang="fr-FR" b="1" dirty="0"/>
+              <a:t>Not </a:t>
+            </a:r>
+            <a:r>
+              <a:rPr lang="fr-FR" b="1" dirty="0" err="1"/>
+              <a:t>required</a:t>
+            </a:r>
+            <a:r>
+              <a:rPr lang="fr-FR" b="1" dirty="0"/>
+              <a:t> for best </a:t>
+            </a:r>
+            <a:r>
+              <a:rPr lang="fr-FR" b="1" dirty="0" err="1"/>
+              <a:t>accuracy</a:t>
+            </a:r>
+            <a:r>
+              <a:rPr lang="fr-FR" dirty="0"/>
+              <a:t>. </a:t>
+            </a:r>
+            <a:r>
+              <a:rPr lang="fr-FR" dirty="0" err="1"/>
+              <a:t>We</a:t>
+            </a:r>
+            <a:r>
+              <a:rPr lang="fr-FR" dirty="0"/>
+              <a:t> </a:t>
+            </a:r>
+            <a:r>
+              <a:rPr lang="fr-FR" dirty="0" err="1"/>
+              <a:t>only</a:t>
+            </a:r>
+            <a:r>
+              <a:rPr lang="fr-FR" dirty="0"/>
+              <a:t> </a:t>
+            </a:r>
+            <a:r>
+              <a:rPr lang="fr-FR" dirty="0" err="1"/>
+              <a:t>want</a:t>
+            </a:r>
+            <a:r>
+              <a:rPr lang="fr-FR" dirty="0"/>
+              <a:t> the body of the model to </a:t>
+            </a:r>
+            <a:r>
+              <a:rPr lang="fr-FR" dirty="0" err="1"/>
+              <a:t>get</a:t>
+            </a:r>
+            <a:r>
+              <a:rPr lang="fr-FR" dirty="0"/>
+              <a:t> </a:t>
+            </a:r>
+            <a:r>
+              <a:rPr lang="fr-FR" dirty="0" err="1"/>
+              <a:t>used</a:t>
+            </a:r>
+            <a:r>
+              <a:rPr lang="fr-FR" dirty="0"/>
+              <a:t> to </a:t>
+            </a:r>
+            <a:r>
+              <a:rPr lang="fr-FR" dirty="0" err="1"/>
+              <a:t>our</a:t>
+            </a:r>
+            <a:r>
+              <a:rPr lang="fr-FR" dirty="0"/>
+              <a:t> corpus of </a:t>
+            </a:r>
+            <a:r>
+              <a:rPr lang="fr-FR" dirty="0" err="1"/>
+              <a:t>words</a:t>
+            </a:r>
+            <a:r>
+              <a:rPr lang="fr-FR" dirty="0"/>
+              <a:t>, not </a:t>
+            </a:r>
+            <a:r>
+              <a:rPr lang="fr-FR" dirty="0" err="1"/>
+              <a:t>necessarily</a:t>
+            </a:r>
+            <a:r>
+              <a:rPr lang="fr-FR" dirty="0"/>
+              <a:t> to </a:t>
+            </a:r>
+            <a:r>
+              <a:rPr lang="fr-FR" dirty="0" err="1"/>
+              <a:t>predict</a:t>
+            </a:r>
+            <a:r>
+              <a:rPr lang="fr-FR" dirty="0"/>
+              <a:t> the </a:t>
+            </a:r>
+            <a:r>
+              <a:rPr lang="fr-FR" dirty="0" err="1"/>
+              <a:t>next</a:t>
+            </a:r>
+            <a:r>
+              <a:rPr lang="fr-FR" dirty="0"/>
+              <a:t> </a:t>
+            </a:r>
+            <a:r>
+              <a:rPr lang="fr-FR" dirty="0" err="1"/>
+              <a:t>word</a:t>
+            </a:r>
+            <a:r>
+              <a:rPr lang="fr-FR" dirty="0"/>
+              <a:t> </a:t>
+            </a:r>
+            <a:r>
+              <a:rPr lang="fr-FR" dirty="0" err="1"/>
+              <a:t>nor</a:t>
+            </a:r>
+            <a:r>
+              <a:rPr lang="fr-FR" dirty="0"/>
+              <a:t> </a:t>
+            </a:r>
+            <a:r>
+              <a:rPr lang="fr-FR" dirty="0" err="1"/>
+              <a:t>overfitting</a:t>
+            </a:r>
+            <a:r>
+              <a:rPr lang="fr-FR" dirty="0"/>
+              <a:t>. </a:t>
+            </a:r>
+          </a:p>
+          <a:p>
+            <a:pPr marL="857250" indent="-857250" algn="l">
+              <a:buFont typeface="Arial" panose="020B0604020202020204" pitchFamily="34" charset="0"/>
+              <a:buChar char="•"/>
+            </a:pPr>
+            <a:r>
+              <a:rPr lang="fr-FR" dirty="0" err="1"/>
+              <a:t>Better</a:t>
+            </a:r>
+            <a:r>
+              <a:rPr lang="fr-FR" dirty="0"/>
+              <a:t> </a:t>
+            </a:r>
+            <a:r>
+              <a:rPr lang="fr-FR" dirty="0" err="1"/>
+              <a:t>accuracy</a:t>
+            </a:r>
+            <a:r>
+              <a:rPr lang="fr-FR" dirty="0"/>
+              <a:t> </a:t>
+            </a:r>
+            <a:r>
+              <a:rPr lang="fr-FR" dirty="0" err="1"/>
+              <a:t>here</a:t>
+            </a:r>
+            <a:r>
+              <a:rPr lang="fr-FR" dirty="0"/>
+              <a:t> </a:t>
+            </a:r>
+            <a:r>
+              <a:rPr lang="fr-FR" dirty="0" err="1"/>
+              <a:t>doesn’t</a:t>
+            </a:r>
+            <a:r>
+              <a:rPr lang="fr-FR" dirty="0"/>
+              <a:t> </a:t>
+            </a:r>
+            <a:r>
+              <a:rPr lang="fr-FR" dirty="0" err="1"/>
+              <a:t>necessarily</a:t>
+            </a:r>
+            <a:r>
+              <a:rPr lang="fr-FR" dirty="0"/>
+              <a:t> </a:t>
+            </a:r>
+            <a:r>
+              <a:rPr lang="fr-FR" dirty="0" err="1"/>
+              <a:t>gives</a:t>
+            </a:r>
+            <a:r>
+              <a:rPr lang="fr-FR" dirty="0"/>
+              <a:t> </a:t>
+            </a:r>
+            <a:r>
+              <a:rPr lang="fr-FR" dirty="0" err="1"/>
+              <a:t>better</a:t>
+            </a:r>
+            <a:r>
+              <a:rPr lang="fr-FR" dirty="0"/>
+              <a:t> </a:t>
+            </a:r>
+            <a:r>
+              <a:rPr lang="fr-FR" dirty="0" err="1"/>
+              <a:t>accuracy</a:t>
+            </a:r>
+            <a:r>
+              <a:rPr lang="fr-FR" dirty="0"/>
+              <a:t> in classification </a:t>
+            </a:r>
+            <a:r>
+              <a:rPr lang="fr-FR" dirty="0" err="1"/>
+              <a:t>task</a:t>
+            </a:r>
+            <a:r>
+              <a:rPr lang="fr-FR" dirty="0"/>
+              <a:t> </a:t>
+            </a:r>
+            <a:r>
+              <a:rPr lang="fr-FR" dirty="0" err="1"/>
+              <a:t>downstream</a:t>
+            </a:r>
+            <a:r>
+              <a:rPr lang="fr-FR" dirty="0"/>
+              <a:t>. </a:t>
+            </a:r>
+            <a:r>
+              <a:rPr lang="fr-FR" dirty="0" err="1"/>
+              <a:t>However</a:t>
+            </a:r>
+            <a:r>
+              <a:rPr lang="fr-FR" dirty="0"/>
+              <a:t> </a:t>
+            </a:r>
+            <a:r>
+              <a:rPr lang="fr-FR" dirty="0" err="1"/>
+              <a:t>under</a:t>
+            </a:r>
+            <a:r>
+              <a:rPr lang="fr-FR" dirty="0"/>
+              <a:t>-training at </a:t>
+            </a:r>
+            <a:r>
+              <a:rPr lang="fr-FR" dirty="0" err="1"/>
+              <a:t>this</a:t>
+            </a:r>
+            <a:r>
+              <a:rPr lang="fr-FR" dirty="0"/>
+              <a:t> phase </a:t>
+            </a:r>
+            <a:r>
+              <a:rPr lang="fr-FR" dirty="0" err="1"/>
+              <a:t>might</a:t>
+            </a:r>
+            <a:r>
+              <a:rPr lang="fr-FR" dirty="0"/>
+              <a:t> </a:t>
+            </a:r>
+            <a:r>
+              <a:rPr lang="fr-FR" dirty="0" err="1"/>
+              <a:t>means</a:t>
+            </a:r>
+            <a:r>
+              <a:rPr lang="fr-FR" dirty="0"/>
+              <a:t> not </a:t>
+            </a:r>
+            <a:r>
+              <a:rPr lang="fr-FR" dirty="0" err="1"/>
+              <a:t>yet</a:t>
+            </a:r>
+            <a:r>
+              <a:rPr lang="fr-FR" dirty="0"/>
+              <a:t> warm up for classification </a:t>
+            </a:r>
+            <a:r>
+              <a:rPr lang="fr-FR" dirty="0" err="1"/>
+              <a:t>task</a:t>
+            </a:r>
+            <a:r>
+              <a:rPr lang="fr-FR" dirty="0"/>
+              <a:t>, </a:t>
+            </a:r>
+            <a:r>
+              <a:rPr lang="fr-FR" dirty="0" err="1"/>
+              <a:t>hence</a:t>
+            </a:r>
+            <a:r>
+              <a:rPr lang="fr-FR" dirty="0"/>
+              <a:t> </a:t>
+            </a:r>
+            <a:r>
+              <a:rPr lang="fr-FR" dirty="0" err="1"/>
+              <a:t>might</a:t>
+            </a:r>
+            <a:r>
+              <a:rPr lang="fr-FR" dirty="0"/>
+              <a:t> </a:t>
+            </a:r>
+            <a:r>
+              <a:rPr lang="fr-FR" dirty="0" err="1"/>
+              <a:t>give</a:t>
+            </a:r>
+            <a:r>
+              <a:rPr lang="fr-FR" dirty="0"/>
+              <a:t> </a:t>
+            </a:r>
+            <a:r>
+              <a:rPr lang="fr-FR" dirty="0" err="1"/>
+              <a:t>worse</a:t>
+            </a:r>
+            <a:r>
+              <a:rPr lang="fr-FR" dirty="0"/>
+              <a:t> classification </a:t>
+            </a:r>
+            <a:r>
+              <a:rPr lang="fr-FR" dirty="0" err="1"/>
+              <a:t>results</a:t>
+            </a:r>
+            <a:r>
+              <a:rPr lang="fr-FR" dirty="0"/>
+              <a:t> </a:t>
+            </a:r>
+            <a:r>
+              <a:rPr lang="fr-FR" dirty="0" err="1"/>
+              <a:t>downstream</a:t>
+            </a:r>
+            <a:r>
+              <a:rPr lang="fr-FR" dirty="0"/>
+              <a:t>.</a:t>
+            </a:r>
+          </a:p>
+          <a:p>
+            <a:pPr marL="857250" indent="-857250" algn="l">
+              <a:buFont typeface="Arial" panose="020B0604020202020204" pitchFamily="34" charset="0"/>
+              <a:buChar char="•"/>
+            </a:pPr>
+            <a:r>
+              <a:rPr lang="fr-FR" dirty="0" err="1"/>
+              <a:t>Depending</a:t>
+            </a:r>
+            <a:r>
+              <a:rPr lang="fr-FR" dirty="0"/>
+              <a:t> on </a:t>
+            </a:r>
+            <a:r>
+              <a:rPr lang="fr-FR" dirty="0" err="1"/>
+              <a:t>number</a:t>
+            </a:r>
+            <a:r>
+              <a:rPr lang="fr-FR" dirty="0"/>
+              <a:t> of </a:t>
+            </a:r>
+            <a:r>
+              <a:rPr lang="fr-FR" dirty="0" err="1"/>
+              <a:t>epochs</a:t>
+            </a:r>
+            <a:r>
+              <a:rPr lang="fr-FR" dirty="0"/>
+              <a:t> train, one manages to </a:t>
+            </a:r>
+            <a:r>
+              <a:rPr lang="fr-FR" dirty="0" err="1"/>
+              <a:t>get</a:t>
+            </a:r>
+            <a:r>
+              <a:rPr lang="fr-FR" dirty="0"/>
+              <a:t> about 0.33 for 3+1 </a:t>
+            </a:r>
+            <a:r>
+              <a:rPr lang="fr-FR" dirty="0" err="1"/>
+              <a:t>epochs</a:t>
+            </a:r>
+            <a:r>
+              <a:rPr lang="fr-FR" dirty="0"/>
+              <a:t> and about 0.34 for 10+1 </a:t>
+            </a:r>
+            <a:r>
+              <a:rPr lang="fr-FR" dirty="0" err="1"/>
+              <a:t>epochs</a:t>
+            </a:r>
+            <a:r>
+              <a:rPr lang="fr-FR" dirty="0"/>
+              <a:t>. </a:t>
+            </a:r>
+          </a:p>
+          <a:p>
+            <a:pPr marL="857250" indent="-857250" algn="l">
+              <a:buFont typeface="Arial" panose="020B0604020202020204" pitchFamily="34" charset="0"/>
+              <a:buChar char="•"/>
+            </a:pPr>
+            <a:r>
+              <a:rPr lang="fr-FR" dirty="0"/>
+              <a:t>+1 </a:t>
+            </a:r>
+            <a:r>
+              <a:rPr lang="fr-FR" dirty="0" err="1"/>
+              <a:t>because</a:t>
+            </a:r>
+            <a:r>
+              <a:rPr lang="fr-FR" dirty="0"/>
+              <a:t> 1 </a:t>
+            </a:r>
+            <a:r>
+              <a:rPr lang="fr-FR" dirty="0" err="1"/>
+              <a:t>additional</a:t>
+            </a:r>
+            <a:r>
+              <a:rPr lang="fr-FR" dirty="0"/>
+              <a:t> </a:t>
+            </a:r>
+            <a:r>
+              <a:rPr lang="fr-FR" dirty="0" err="1"/>
+              <a:t>epoch</a:t>
+            </a:r>
+            <a:r>
+              <a:rPr lang="fr-FR" dirty="0"/>
+              <a:t> </a:t>
+            </a:r>
+            <a:r>
+              <a:rPr lang="fr-FR" dirty="0" err="1"/>
+              <a:t>is</a:t>
+            </a:r>
+            <a:r>
+              <a:rPr lang="fr-FR" dirty="0"/>
+              <a:t> </a:t>
+            </a:r>
+            <a:r>
+              <a:rPr lang="fr-FR" dirty="0" err="1"/>
+              <a:t>trained</a:t>
+            </a:r>
+            <a:r>
+              <a:rPr lang="fr-FR" dirty="0"/>
+              <a:t> </a:t>
+            </a:r>
+            <a:r>
+              <a:rPr lang="fr-FR" dirty="0" err="1"/>
+              <a:t>with</a:t>
+            </a:r>
+            <a:r>
+              <a:rPr lang="fr-FR" dirty="0"/>
+              <a:t> the model </a:t>
+            </a:r>
+            <a:r>
+              <a:rPr lang="fr-FR" dirty="0" err="1"/>
+              <a:t>frozen</a:t>
+            </a:r>
+            <a:r>
+              <a:rPr lang="fr-FR" dirty="0"/>
+              <a:t> </a:t>
+            </a:r>
+            <a:r>
+              <a:rPr lang="fr-FR" dirty="0" err="1"/>
+              <a:t>except</a:t>
+            </a:r>
+            <a:r>
+              <a:rPr lang="fr-FR" dirty="0"/>
+              <a:t> the </a:t>
+            </a:r>
+            <a:r>
+              <a:rPr lang="fr-FR" dirty="0" err="1"/>
+              <a:t>head</a:t>
+            </a:r>
+            <a:r>
+              <a:rPr lang="fr-FR" dirty="0"/>
+              <a:t>, and the </a:t>
+            </a:r>
+            <a:r>
+              <a:rPr lang="fr-FR" dirty="0" err="1"/>
+              <a:t>rest</a:t>
+            </a:r>
+            <a:r>
+              <a:rPr lang="fr-FR" dirty="0"/>
+              <a:t> </a:t>
+            </a:r>
+            <a:r>
+              <a:rPr lang="fr-FR" dirty="0" err="1"/>
+              <a:t>being</a:t>
+            </a:r>
+            <a:r>
+              <a:rPr lang="fr-FR" dirty="0"/>
+              <a:t> fine-tuning the </a:t>
+            </a:r>
+            <a:r>
+              <a:rPr lang="fr-FR" dirty="0" err="1"/>
+              <a:t>whole</a:t>
+            </a:r>
+            <a:r>
+              <a:rPr lang="fr-FR" dirty="0"/>
+              <a:t> model. </a:t>
+            </a:r>
+          </a:p>
+          <a:p>
+            <a:endParaRPr lang="en-US" dirty="0">
+              <a:solidFill>
+                <a:srgbClr val="FF6600"/>
+              </a:solidFill>
+            </a:endParaRPr>
+          </a:p>
+        </p:txBody>
+      </p:sp>
+    </p:spTree>
+    <p:extLst>
+      <p:ext uri="{BB962C8B-B14F-4D97-AF65-F5344CB8AC3E}">
+        <p14:creationId xmlns:p14="http://schemas.microsoft.com/office/powerpoint/2010/main" val="2776838363"/>
+      </p:ext>
+    </p:extLst>
+  </p:cSld>
+  <p:clrMapOvr>
+    <a:masterClrMapping/>
+  </p:clrMapOvr>
+</p:sld>
+</file>
+
+<file path=ppt/slides/slide11.xml><?xml version="1.0" encoding="utf-8"?>
+<p:sld xmlns:a="http://schemas.openxmlformats.org/drawingml/2006/main" xmlns:r="http://schemas.openxmlformats.org/officeDocument/2006/relationships" xmlns:p="http://schemas.openxmlformats.org/presentationml/2006/main">
+  <p:cSld>
+    <p:spTree>
+      <p:nvGrpSpPr>
+        <p:cNvPr id="1" name=""/>
+        <p:cNvGrpSpPr/>
+        <p:nvPr/>
+      </p:nvGrpSpPr>
+      <p:grpSpPr>
+        <a:xfrm>
+          <a:off x="0" y="0"/>
+          <a:ext cx="0" cy="0"/>
+          <a:chOff x="0" y="0"/>
+          <a:chExt cx="0" cy="0"/>
+        </a:xfrm>
+      </p:grpSpPr>
+      <p:sp>
+        <p:nvSpPr>
+          <p:cNvPr id="2" name="Title 1">
+            <a:extLst>
+              <a:ext uri="{FF2B5EF4-FFF2-40B4-BE49-F238E27FC236}">
+                <a16:creationId xmlns:a16="http://schemas.microsoft.com/office/drawing/2014/main" id="{E8B8F26E-9345-4747-9094-972E38700A17}"/>
+              </a:ext>
+            </a:extLst>
+          </p:cNvPr>
+          <p:cNvSpPr>
+            <a:spLocks noGrp="1"/>
+          </p:cNvSpPr>
+          <p:nvPr>
+            <p:ph type="ctrTitle"/>
+          </p:nvPr>
+        </p:nvSpPr>
+        <p:spPr>
+          <a:xfrm rot="5400000">
+            <a:off x="-562431" y="562430"/>
+            <a:ext cx="6858002" cy="5733142"/>
+          </a:xfrm>
+          <a:solidFill>
+            <a:srgbClr val="3B3B3B"/>
+          </a:solidFill>
+        </p:spPr>
+        <p:txBody>
+          <a:bodyPr vert="vert270" anchor="t" anchorCtr="0"/>
+          <a:lstStyle/>
+          <a:p>
+            <a:r>
+              <a:rPr lang="en-US" b="1" dirty="0">
+                <a:solidFill>
+                  <a:srgbClr val="FF6600"/>
+                </a:solidFill>
+              </a:rPr>
+              <a:t>Classification Training Stage</a:t>
+            </a:r>
+          </a:p>
+        </p:txBody>
+      </p:sp>
+      <p:pic>
+        <p:nvPicPr>
+          <p:cNvPr id="4" name="Picture 3">
+            <a:extLst>
+              <a:ext uri="{FF2B5EF4-FFF2-40B4-BE49-F238E27FC236}">
+                <a16:creationId xmlns:a16="http://schemas.microsoft.com/office/drawing/2014/main" id="{7A465064-0714-5743-882B-8875105A7023}"/>
+              </a:ext>
+            </a:extLst>
+          </p:cNvPr>
+          <p:cNvPicPr>
+            <a:picLocks noChangeAspect="1"/>
+          </p:cNvPicPr>
+          <p:nvPr/>
+        </p:nvPicPr>
+        <p:blipFill>
+          <a:blip r:embed="rId2" cstate="print">
+            <a:extLst>
+              <a:ext uri="{28A0092B-C50C-407E-A947-70E740481C1C}">
+                <a14:useLocalDpi xmlns:a14="http://schemas.microsoft.com/office/drawing/2010/main" val="0"/>
+              </a:ext>
+            </a:extLst>
+          </a:blip>
+          <a:stretch>
+            <a:fillRect/>
+          </a:stretch>
+        </p:blipFill>
+        <p:spPr>
+          <a:xfrm>
+            <a:off x="0" y="5863771"/>
+            <a:ext cx="1654627" cy="994232"/>
+          </a:xfrm>
+          <a:prstGeom prst="rect">
+            <a:avLst/>
+          </a:prstGeom>
+        </p:spPr>
+      </p:pic>
+      <p:sp>
+        <p:nvSpPr>
+          <p:cNvPr id="6" name="Subtitle 5">
+            <a:extLst>
+              <a:ext uri="{FF2B5EF4-FFF2-40B4-BE49-F238E27FC236}">
+                <a16:creationId xmlns:a16="http://schemas.microsoft.com/office/drawing/2014/main" id="{2D4BA697-580E-5544-8F2F-194AD99B859F}"/>
+              </a:ext>
+            </a:extLst>
+          </p:cNvPr>
+          <p:cNvSpPr>
+            <a:spLocks noGrp="1"/>
+          </p:cNvSpPr>
+          <p:nvPr>
+            <p:ph type="subTitle" idx="1"/>
+          </p:nvPr>
+        </p:nvSpPr>
+        <p:spPr>
+          <a:xfrm>
+            <a:off x="5733141" y="0"/>
+            <a:ext cx="6458859" cy="6858000"/>
+          </a:xfrm>
+        </p:spPr>
+        <p:txBody>
+          <a:bodyPr>
+            <a:normAutofit/>
+          </a:bodyPr>
+          <a:lstStyle/>
+          <a:p>
+            <a:pPr marL="857250" indent="-857250" algn="l">
+              <a:buFont typeface="Arial" panose="020B0604020202020204" pitchFamily="34" charset="0"/>
+              <a:buChar char="•"/>
+            </a:pPr>
+            <a:r>
+              <a:rPr lang="fr-FR" sz="2900" dirty="0" err="1"/>
+              <a:t>Gradual</a:t>
+            </a:r>
+            <a:r>
+              <a:rPr lang="fr-FR" sz="2900" dirty="0"/>
+              <a:t> </a:t>
+            </a:r>
+            <a:r>
+              <a:rPr lang="fr-FR" sz="2900" dirty="0" err="1"/>
+              <a:t>Unfreezing</a:t>
+            </a:r>
+            <a:r>
+              <a:rPr lang="fr-FR" sz="2900" dirty="0"/>
+              <a:t> technique: </a:t>
+            </a:r>
+            <a:r>
+              <a:rPr lang="fr-FR" sz="2900" dirty="0" err="1"/>
+              <a:t>slowly</a:t>
+            </a:r>
+            <a:r>
+              <a:rPr lang="fr-FR" sz="2900" dirty="0"/>
+              <a:t> </a:t>
+            </a:r>
+            <a:r>
+              <a:rPr lang="fr-FR" sz="2900" dirty="0" err="1"/>
+              <a:t>unfreeze</a:t>
+            </a:r>
+            <a:r>
+              <a:rPr lang="fr-FR" sz="2900" dirty="0"/>
+              <a:t> </a:t>
+            </a:r>
+            <a:r>
+              <a:rPr lang="fr-FR" sz="2900" dirty="0" err="1"/>
+              <a:t>from</a:t>
+            </a:r>
+            <a:r>
+              <a:rPr lang="fr-FR" sz="2900" dirty="0"/>
+              <a:t> the </a:t>
+            </a:r>
+            <a:r>
+              <a:rPr lang="fr-FR" sz="2900" dirty="0" err="1"/>
+              <a:t>head</a:t>
+            </a:r>
+            <a:r>
+              <a:rPr lang="fr-FR" sz="2900" dirty="0"/>
+              <a:t> </a:t>
+            </a:r>
+            <a:r>
+              <a:rPr lang="fr-FR" sz="2900" dirty="0" err="1"/>
+              <a:t>towards</a:t>
+            </a:r>
+            <a:r>
+              <a:rPr lang="fr-FR" sz="2900" dirty="0"/>
+              <a:t> the body, one layer by one layer, </a:t>
+            </a:r>
+            <a:r>
+              <a:rPr lang="fr-FR" sz="2900" dirty="0" err="1"/>
+              <a:t>each</a:t>
+            </a:r>
+            <a:r>
+              <a:rPr lang="fr-FR" sz="2900" dirty="0"/>
+              <a:t> training for </a:t>
+            </a:r>
+            <a:r>
+              <a:rPr lang="fr-FR" sz="2900" dirty="0" err="1"/>
+              <a:t>some</a:t>
+            </a:r>
+            <a:r>
+              <a:rPr lang="fr-FR" sz="2900" dirty="0"/>
+              <a:t> </a:t>
+            </a:r>
+            <a:r>
+              <a:rPr lang="fr-FR" sz="2900" dirty="0" err="1"/>
+              <a:t>epochs</a:t>
+            </a:r>
+            <a:r>
+              <a:rPr lang="fr-FR" sz="2900" dirty="0"/>
+              <a:t>. This </a:t>
+            </a:r>
+            <a:r>
+              <a:rPr lang="fr-FR" sz="2900" dirty="0" err="1"/>
+              <a:t>gives</a:t>
+            </a:r>
+            <a:r>
+              <a:rPr lang="fr-FR" sz="2900" dirty="0"/>
+              <a:t> </a:t>
+            </a:r>
+            <a:r>
+              <a:rPr lang="fr-FR" sz="2900" dirty="0" err="1"/>
+              <a:t>better</a:t>
+            </a:r>
+            <a:r>
+              <a:rPr lang="fr-FR" sz="2900" dirty="0"/>
+              <a:t> </a:t>
+            </a:r>
+            <a:r>
+              <a:rPr lang="fr-FR" sz="2900" dirty="0" err="1"/>
+              <a:t>result</a:t>
+            </a:r>
+            <a:r>
+              <a:rPr lang="fr-FR" sz="2900" dirty="0"/>
+              <a:t>. </a:t>
+            </a:r>
+          </a:p>
+          <a:p>
+            <a:pPr marL="857250" indent="-857250" algn="l">
+              <a:buFont typeface="Arial" panose="020B0604020202020204" pitchFamily="34" charset="0"/>
+              <a:buChar char="•"/>
+            </a:pPr>
+            <a:r>
+              <a:rPr lang="fr-FR" sz="2900" dirty="0" err="1"/>
+              <a:t>Gradual</a:t>
+            </a:r>
+            <a:r>
+              <a:rPr lang="fr-FR" sz="2900" dirty="0"/>
+              <a:t> </a:t>
+            </a:r>
+            <a:r>
+              <a:rPr lang="fr-FR" sz="2900" dirty="0" err="1"/>
+              <a:t>decrement</a:t>
+            </a:r>
+            <a:r>
+              <a:rPr lang="fr-FR" sz="2900" dirty="0"/>
+              <a:t> of </a:t>
+            </a:r>
+            <a:r>
+              <a:rPr lang="fr-FR" sz="2900" dirty="0" err="1"/>
+              <a:t>learning</a:t>
+            </a:r>
+            <a:r>
+              <a:rPr lang="fr-FR" sz="2900" dirty="0"/>
+              <a:t> rate: as </a:t>
+            </a:r>
+            <a:r>
+              <a:rPr lang="fr-FR" sz="2900" dirty="0" err="1"/>
+              <a:t>unfreezing</a:t>
+            </a:r>
+            <a:r>
+              <a:rPr lang="fr-FR" sz="2900" dirty="0"/>
+              <a:t> </a:t>
+            </a:r>
+            <a:r>
+              <a:rPr lang="fr-FR" sz="2900" dirty="0" err="1"/>
+              <a:t>goes</a:t>
+            </a:r>
+            <a:r>
+              <a:rPr lang="fr-FR" sz="2900" dirty="0"/>
+              <a:t>, </a:t>
+            </a:r>
+            <a:r>
+              <a:rPr lang="fr-FR" sz="2900" dirty="0" err="1"/>
+              <a:t>learning</a:t>
+            </a:r>
+            <a:r>
+              <a:rPr lang="fr-FR" sz="2900" dirty="0"/>
+              <a:t> rate </a:t>
+            </a:r>
+            <a:r>
+              <a:rPr lang="fr-FR" sz="2900" dirty="0" err="1"/>
+              <a:t>decrease</a:t>
+            </a:r>
+            <a:r>
+              <a:rPr lang="fr-FR" sz="2900" dirty="0"/>
+              <a:t> to not </a:t>
+            </a:r>
+            <a:r>
+              <a:rPr lang="fr-FR" sz="2900" dirty="0" err="1"/>
+              <a:t>perturb</a:t>
+            </a:r>
+            <a:r>
+              <a:rPr lang="fr-FR" sz="2900" dirty="0"/>
+              <a:t> the </a:t>
+            </a:r>
+            <a:r>
+              <a:rPr lang="fr-FR" sz="2900" dirty="0" err="1"/>
+              <a:t>pretrained</a:t>
+            </a:r>
+            <a:r>
+              <a:rPr lang="fr-FR" sz="2900" dirty="0"/>
+              <a:t> model </a:t>
+            </a:r>
+            <a:r>
+              <a:rPr lang="fr-FR" sz="2900" dirty="0" err="1"/>
+              <a:t>weights</a:t>
+            </a:r>
+            <a:r>
+              <a:rPr lang="fr-FR" sz="2900" dirty="0"/>
+              <a:t> by </a:t>
+            </a:r>
+            <a:r>
+              <a:rPr lang="fr-FR" sz="2900" dirty="0" err="1"/>
+              <a:t>too</a:t>
+            </a:r>
+            <a:r>
+              <a:rPr lang="fr-FR" sz="2900" dirty="0"/>
+              <a:t> </a:t>
+            </a:r>
+            <a:r>
+              <a:rPr lang="fr-FR" sz="2900" dirty="0" err="1"/>
+              <a:t>much</a:t>
+            </a:r>
+            <a:r>
+              <a:rPr lang="fr-FR" sz="2900" dirty="0"/>
+              <a:t>. </a:t>
+            </a:r>
+          </a:p>
+          <a:p>
+            <a:pPr marL="857250" indent="-857250" algn="l">
+              <a:buFont typeface="Arial" panose="020B0604020202020204" pitchFamily="34" charset="0"/>
+              <a:buChar char="•"/>
+            </a:pPr>
+            <a:r>
+              <a:rPr lang="fr-FR" sz="2900" dirty="0" err="1"/>
+              <a:t>Results</a:t>
+            </a:r>
+            <a:r>
+              <a:rPr lang="fr-FR" sz="2900" dirty="0"/>
+              <a:t> </a:t>
+            </a:r>
+            <a:r>
+              <a:rPr lang="fr-FR" sz="2900" dirty="0" err="1"/>
+              <a:t>around</a:t>
+            </a:r>
+            <a:r>
+              <a:rPr lang="fr-FR" sz="2900" dirty="0"/>
+              <a:t> 0.82-0.83 for </a:t>
+            </a:r>
+            <a:r>
+              <a:rPr lang="fr-FR" sz="2900" dirty="0" err="1"/>
+              <a:t>several</a:t>
+            </a:r>
+            <a:r>
+              <a:rPr lang="fr-FR" sz="2900" dirty="0"/>
+              <a:t> </a:t>
+            </a:r>
+            <a:r>
+              <a:rPr lang="fr-FR" sz="2900" dirty="0" err="1"/>
+              <a:t>epochs</a:t>
+            </a:r>
+            <a:r>
+              <a:rPr lang="fr-FR" sz="2900" dirty="0"/>
+              <a:t> of training. </a:t>
+            </a:r>
+          </a:p>
+          <a:p>
+            <a:pPr marL="857250" indent="-857250" algn="l">
+              <a:buFont typeface="Arial" panose="020B0604020202020204" pitchFamily="34" charset="0"/>
+              <a:buChar char="•"/>
+            </a:pPr>
+            <a:r>
+              <a:rPr lang="fr-FR" sz="2900" dirty="0"/>
+              <a:t>Best benchmarking </a:t>
+            </a:r>
+            <a:r>
+              <a:rPr lang="fr-FR" sz="2900" dirty="0" err="1"/>
+              <a:t>result</a:t>
+            </a:r>
+            <a:r>
+              <a:rPr lang="fr-FR" sz="2900" dirty="0"/>
+              <a:t> are at 0.886. [2] Our </a:t>
+            </a:r>
+            <a:r>
+              <a:rPr lang="fr-FR" sz="2900" dirty="0" err="1"/>
+              <a:t>result</a:t>
+            </a:r>
+            <a:r>
+              <a:rPr lang="fr-FR" sz="2900" dirty="0"/>
+              <a:t> </a:t>
+            </a:r>
+            <a:r>
+              <a:rPr lang="fr-FR" sz="2900" dirty="0" err="1"/>
+              <a:t>would</a:t>
+            </a:r>
+            <a:r>
+              <a:rPr lang="fr-FR" sz="2900" dirty="0"/>
+              <a:t> let us </a:t>
+            </a:r>
+            <a:r>
+              <a:rPr lang="fr-FR" sz="2900" dirty="0" err="1"/>
+              <a:t>be</a:t>
+            </a:r>
+            <a:r>
+              <a:rPr lang="fr-FR" sz="2900" dirty="0"/>
+              <a:t> in the top 11. </a:t>
+            </a:r>
+          </a:p>
+          <a:p>
+            <a:pPr marL="857250" indent="-857250" algn="l">
+              <a:buFont typeface="Arial" panose="020B0604020202020204" pitchFamily="34" charset="0"/>
+              <a:buChar char="•"/>
+            </a:pPr>
+            <a:endParaRPr lang="en-US" sz="2900" dirty="0">
+              <a:solidFill>
+                <a:srgbClr val="FF6600"/>
+              </a:solidFill>
+            </a:endParaRPr>
+          </a:p>
+        </p:txBody>
+      </p:sp>
+    </p:spTree>
+    <p:extLst>
+      <p:ext uri="{BB962C8B-B14F-4D97-AF65-F5344CB8AC3E}">
+        <p14:creationId xmlns:p14="http://schemas.microsoft.com/office/powerpoint/2010/main" val="44715776"/>
+      </p:ext>
+    </p:extLst>
+  </p:cSld>
+  <p:clrMapOvr>
+    <a:masterClrMapping/>
+  </p:clrMapOvr>
+</p:sld>
+</file>
+
+<file path=ppt/slides/slide12.xml><?xml version="1.0" encoding="utf-8"?>
+<p:sld xmlns:a="http://schemas.openxmlformats.org/drawingml/2006/main" xmlns:r="http://schemas.openxmlformats.org/officeDocument/2006/relationships" xmlns:p="http://schemas.openxmlformats.org/presentationml/2006/main">
+  <p:cSld>
+    <p:spTree>
+      <p:nvGrpSpPr>
+        <p:cNvPr id="1" name=""/>
+        <p:cNvGrpSpPr/>
+        <p:nvPr/>
+      </p:nvGrpSpPr>
+      <p:grpSpPr>
+        <a:xfrm>
+          <a:off x="0" y="0"/>
+          <a:ext cx="0" cy="0"/>
+          <a:chOff x="0" y="0"/>
+          <a:chExt cx="0" cy="0"/>
+        </a:xfrm>
+      </p:grpSpPr>
+      <p:sp>
+        <p:nvSpPr>
+          <p:cNvPr id="2" name="Title 1">
+            <a:extLst>
+              <a:ext uri="{FF2B5EF4-FFF2-40B4-BE49-F238E27FC236}">
+                <a16:creationId xmlns:a16="http://schemas.microsoft.com/office/drawing/2014/main" id="{E8B8F26E-9345-4747-9094-972E38700A17}"/>
+              </a:ext>
+            </a:extLst>
+          </p:cNvPr>
+          <p:cNvSpPr>
+            <a:spLocks noGrp="1"/>
+          </p:cNvSpPr>
+          <p:nvPr>
+            <p:ph type="ctrTitle"/>
+          </p:nvPr>
+        </p:nvSpPr>
+        <p:spPr>
+          <a:xfrm rot="5400000">
+            <a:off x="-562431" y="562430"/>
+            <a:ext cx="6858002" cy="5733142"/>
+          </a:xfrm>
+          <a:solidFill>
+            <a:srgbClr val="3B3B3B"/>
+          </a:solidFill>
+        </p:spPr>
+        <p:txBody>
+          <a:bodyPr vert="vert270" anchor="t" anchorCtr="0"/>
+          <a:lstStyle/>
+          <a:p>
+            <a:r>
+              <a:rPr lang="en-US" b="1" dirty="0">
+                <a:solidFill>
+                  <a:srgbClr val="FF6600"/>
+                </a:solidFill>
+              </a:rPr>
+              <a:t>References</a:t>
+            </a:r>
+          </a:p>
+        </p:txBody>
+      </p:sp>
+      <p:pic>
+        <p:nvPicPr>
+          <p:cNvPr id="4" name="Picture 3">
+            <a:extLst>
+              <a:ext uri="{FF2B5EF4-FFF2-40B4-BE49-F238E27FC236}">
+                <a16:creationId xmlns:a16="http://schemas.microsoft.com/office/drawing/2014/main" id="{7A465064-0714-5743-882B-8875105A7023}"/>
+              </a:ext>
+            </a:extLst>
+          </p:cNvPr>
+          <p:cNvPicPr>
+            <a:picLocks noChangeAspect="1"/>
+          </p:cNvPicPr>
+          <p:nvPr/>
+        </p:nvPicPr>
+        <p:blipFill>
+          <a:blip r:embed="rId2" cstate="print">
+            <a:extLst>
+              <a:ext uri="{28A0092B-C50C-407E-A947-70E740481C1C}">
+                <a14:useLocalDpi xmlns:a14="http://schemas.microsoft.com/office/drawing/2010/main" val="0"/>
+              </a:ext>
+            </a:extLst>
+          </a:blip>
+          <a:stretch>
+            <a:fillRect/>
+          </a:stretch>
+        </p:blipFill>
+        <p:spPr>
+          <a:xfrm>
+            <a:off x="0" y="5863771"/>
+            <a:ext cx="1654627" cy="994232"/>
+          </a:xfrm>
+          <a:prstGeom prst="rect">
+            <a:avLst/>
+          </a:prstGeom>
+        </p:spPr>
+      </p:pic>
+      <p:sp>
+        <p:nvSpPr>
+          <p:cNvPr id="6" name="Subtitle 5">
+            <a:extLst>
+              <a:ext uri="{FF2B5EF4-FFF2-40B4-BE49-F238E27FC236}">
+                <a16:creationId xmlns:a16="http://schemas.microsoft.com/office/drawing/2014/main" id="{2D4BA697-580E-5544-8F2F-194AD99B859F}"/>
+              </a:ext>
+            </a:extLst>
+          </p:cNvPr>
+          <p:cNvSpPr>
+            <a:spLocks noGrp="1"/>
+          </p:cNvSpPr>
+          <p:nvPr>
+            <p:ph type="subTitle" idx="1"/>
+          </p:nvPr>
+        </p:nvSpPr>
+        <p:spPr>
+          <a:xfrm>
+            <a:off x="5733141" y="0"/>
+            <a:ext cx="6458859" cy="6858000"/>
+          </a:xfrm>
+        </p:spPr>
+        <p:txBody>
+          <a:bodyPr>
+            <a:normAutofit/>
+          </a:bodyPr>
+          <a:lstStyle/>
+          <a:p>
+            <a:pPr marL="0" indent="0" algn="l">
+              <a:buNone/>
+            </a:pPr>
+            <a:r>
+              <a:rPr lang="fr-FR" sz="2900" dirty="0"/>
+              <a:t>[1] </a:t>
+            </a:r>
+            <a:r>
+              <a:rPr lang="fr-FR" sz="2900" dirty="0">
+                <a:hlinkClick r:id="rId3"/>
+              </a:rPr>
+              <a:t>https://yashuseth.blog/2018/09/12/awd-lstm-explanation-understanding-language-model/</a:t>
+            </a:r>
+            <a:endParaRPr lang="fr-FR" sz="2900" dirty="0"/>
+          </a:p>
+          <a:p>
+            <a:pPr marL="0" indent="0" algn="l">
+              <a:buNone/>
+            </a:pPr>
+            <a:r>
+              <a:rPr lang="fr-FR" sz="2900" dirty="0"/>
+              <a:t>[2] </a:t>
+            </a:r>
+            <a:r>
+              <a:rPr lang="fr-FR" sz="2900" dirty="0">
+                <a:hlinkClick r:id="rId4"/>
+              </a:rPr>
+              <a:t>https://paperswithcode.com/sota/text-classification-on-20news</a:t>
+            </a:r>
+            <a:endParaRPr lang="fr-FR" sz="2900" dirty="0"/>
+          </a:p>
+          <a:p>
+            <a:pPr algn="l"/>
+            <a:endParaRPr lang="en-US" sz="2900" dirty="0">
+              <a:solidFill>
+                <a:srgbClr val="FF6600"/>
+              </a:solidFill>
+            </a:endParaRPr>
+          </a:p>
+        </p:txBody>
+      </p:sp>
+    </p:spTree>
+    <p:extLst>
+      <p:ext uri="{BB962C8B-B14F-4D97-AF65-F5344CB8AC3E}">
+        <p14:creationId xmlns:p14="http://schemas.microsoft.com/office/powerpoint/2010/main" val="2113172012"/>
       </p:ext>
     </p:extLst>
   </p:cSld>
@@ -3412,8 +4686,8 @@
         </p:nvSpPr>
         <p:spPr>
           <a:xfrm rot="5400000">
-            <a:off x="-562431" y="562430"/>
-            <a:ext cx="6858002" cy="5733142"/>
+            <a:off x="2666998" y="-2667000"/>
+            <a:ext cx="6858002" cy="12192001"/>
           </a:xfrm>
           <a:solidFill>
             <a:srgbClr val="3B3B3B"/>
@@ -3423,19 +4697,23 @@
           <a:bodyPr vert="vert270" anchor="t" anchorCtr="0"/>
           <a:lstStyle/>
           <a:p>
+            <a:br>
+              <a:rPr lang="en-US" dirty="0"/>
+            </a:br>
+            <a:br>
+              <a:rPr lang="en-US" dirty="0"/>
+            </a:br>
+            <a:br>
+              <a:rPr lang="en-US" dirty="0"/>
+            </a:br>
             <a:r>
               <a:rPr lang="en-US" b="1" dirty="0">
                 <a:solidFill>
                   <a:srgbClr val="FF6600"/>
                 </a:solidFill>
               </a:rPr>
-              <a:t>Cleaning Data</a:t>
-            </a:r>
-            <a:endParaRPr lang="en-US" b="1" dirty="0">
-              <a:solidFill>
-                <a:schemeClr val="bg1"/>
-              </a:solidFill>
-            </a:endParaRPr>
+              <a:t>Basic Model</a:t>
+            </a:r>
           </a:p>
         </p:txBody>
       </p:sp>
@@ -3475,464 +4753,10 @@
           </a:prstGeom>
         </p:spPr>
       </p:pic>
-      <p:sp>
-        <p:nvSpPr>
-          <p:cNvPr id="6" name="Subtitle 5">
-            <a:extLst>
-              <a:ext uri="{FF2B5EF4-FFF2-40B4-BE49-F238E27FC236}">
-                <a16:creationId xmlns:a16="http://schemas.microsoft.com/office/drawing/2014/main" id="{2D4BA697-580E-5544-8F2F-194AD99B859F}"/>
-              </a:ext>
-            </a:extLst>
-          </p:cNvPr>
-          <p:cNvSpPr>
-            <a:spLocks noGrp="1"/>
-          </p:cNvSpPr>
-          <p:nvPr>
-            <p:ph type="subTitle" idx="1"/>
-          </p:nvPr>
-        </p:nvSpPr>
-        <p:spPr>
-          <a:xfrm>
-            <a:off x="5733141" y="0"/>
-            <a:ext cx="6458859" cy="6858000"/>
-          </a:xfrm>
-        </p:spPr>
-        <p:txBody>
-          <a:bodyPr>
-            <a:normAutofit fontScale="40000" lnSpcReduction="20000"/>
-          </a:bodyPr>
-          <a:lstStyle/>
-          <a:p>
-            <a:pPr marL="857250" indent="-857250" algn="l">
-              <a:buFont typeface="Arial" panose="020B0604020202020204" pitchFamily="34" charset="0"/>
-              <a:buChar char="•"/>
-            </a:pPr>
-            <a:r>
-              <a:rPr lang="fr-FR" sz="7200" dirty="0" err="1"/>
-              <a:t>Thresholding</a:t>
-            </a:r>
-            <a:r>
-              <a:rPr lang="fr-FR" sz="7200" dirty="0"/>
-              <a:t> line </a:t>
-            </a:r>
-            <a:r>
-              <a:rPr lang="fr-FR" sz="7200" dirty="0" err="1"/>
-              <a:t>number</a:t>
-            </a:r>
-            <a:r>
-              <a:rPr lang="fr-FR" sz="7200" dirty="0"/>
-              <a:t>: picking </a:t>
-            </a:r>
-            <a:r>
-              <a:rPr lang="fr-FR" sz="7200" dirty="0" err="1"/>
-              <a:t>only</a:t>
-            </a:r>
-            <a:r>
-              <a:rPr lang="fr-FR" sz="7200" dirty="0"/>
-              <a:t> </a:t>
-            </a:r>
-            <a:r>
-              <a:rPr lang="fr-FR" sz="7200" dirty="0" err="1"/>
-              <a:t>those</a:t>
-            </a:r>
-            <a:r>
-              <a:rPr lang="fr-FR" sz="7200" dirty="0"/>
-              <a:t> data </a:t>
-            </a:r>
-            <a:r>
-              <a:rPr lang="fr-FR" sz="7200" dirty="0" err="1"/>
-              <a:t>that</a:t>
-            </a:r>
-            <a:r>
-              <a:rPr lang="fr-FR" sz="7200" dirty="0"/>
-              <a:t> are </a:t>
-            </a:r>
-            <a:r>
-              <a:rPr lang="fr-FR" sz="7200" dirty="0" err="1"/>
-              <a:t>larger</a:t>
-            </a:r>
-            <a:r>
-              <a:rPr lang="fr-FR" sz="7200" dirty="0"/>
-              <a:t> </a:t>
-            </a:r>
-            <a:r>
-              <a:rPr lang="fr-FR" sz="7200" dirty="0" err="1"/>
-              <a:t>than</a:t>
-            </a:r>
-            <a:r>
-              <a:rPr lang="fr-FR" sz="7200" dirty="0"/>
-              <a:t> a certain line </a:t>
-            </a:r>
-            <a:r>
-              <a:rPr lang="fr-FR" sz="7200" dirty="0" err="1"/>
-              <a:t>number</a:t>
-            </a:r>
-            <a:r>
-              <a:rPr lang="fr-FR" sz="7200" dirty="0"/>
-              <a:t>. </a:t>
-            </a:r>
-            <a:r>
-              <a:rPr lang="fr-FR" sz="7200" dirty="0" err="1"/>
-              <a:t>We</a:t>
-            </a:r>
-            <a:r>
-              <a:rPr lang="fr-FR" sz="7200" dirty="0"/>
-              <a:t> use 7 </a:t>
-            </a:r>
-            <a:r>
-              <a:rPr lang="fr-FR" sz="7200" dirty="0" err="1"/>
-              <a:t>lines</a:t>
-            </a:r>
-            <a:r>
-              <a:rPr lang="fr-FR" sz="7200" dirty="0"/>
-              <a:t> as </a:t>
-            </a:r>
-            <a:r>
-              <a:rPr lang="fr-FR" sz="7200" dirty="0" err="1"/>
-              <a:t>threshold</a:t>
-            </a:r>
-            <a:r>
-              <a:rPr lang="fr-FR" sz="7200" dirty="0"/>
-              <a:t> (</a:t>
-            </a:r>
-            <a:r>
-              <a:rPr lang="fr-FR" sz="7200" dirty="0" err="1"/>
-              <a:t>excluding</a:t>
-            </a:r>
-            <a:r>
-              <a:rPr lang="fr-FR" sz="7200" dirty="0"/>
-              <a:t> extra </a:t>
-            </a:r>
-            <a:r>
-              <a:rPr lang="fr-FR" sz="7200" dirty="0" err="1"/>
-              <a:t>newlines</a:t>
-            </a:r>
-            <a:r>
-              <a:rPr lang="fr-FR" sz="7200" dirty="0"/>
-              <a:t>).</a:t>
-            </a:r>
-          </a:p>
-          <a:p>
-            <a:pPr marL="857250" indent="-857250" algn="l">
-              <a:buFont typeface="Arial" panose="020B0604020202020204" pitchFamily="34" charset="0"/>
-              <a:buChar char="•"/>
-            </a:pPr>
-            <a:r>
-              <a:rPr lang="fr-FR" sz="7200" dirty="0"/>
-              <a:t>OOV article </a:t>
-            </a:r>
-            <a:r>
-              <a:rPr lang="fr-FR" sz="7200" dirty="0" err="1"/>
-              <a:t>removal</a:t>
-            </a:r>
-            <a:r>
-              <a:rPr lang="fr-FR" sz="7200" dirty="0"/>
-              <a:t>: </a:t>
-            </a:r>
-            <a:r>
-              <a:rPr lang="fr-FR" sz="7200" dirty="0" err="1"/>
-              <a:t>remove</a:t>
-            </a:r>
-            <a:r>
-              <a:rPr lang="fr-FR" sz="7200" dirty="0"/>
-              <a:t> all articles </a:t>
-            </a:r>
-            <a:r>
-              <a:rPr lang="fr-FR" sz="7200" dirty="0" err="1"/>
-              <a:t>with</a:t>
-            </a:r>
-            <a:r>
-              <a:rPr lang="fr-FR" sz="7200" dirty="0"/>
-              <a:t> OOV </a:t>
-            </a:r>
-            <a:r>
-              <a:rPr lang="fr-FR" sz="7200" dirty="0" err="1"/>
-              <a:t>occupying</a:t>
-            </a:r>
-            <a:r>
-              <a:rPr lang="fr-FR" sz="7200" dirty="0"/>
-              <a:t> more </a:t>
-            </a:r>
-            <a:r>
-              <a:rPr lang="fr-FR" sz="7200" dirty="0" err="1"/>
-              <a:t>than</a:t>
-            </a:r>
-            <a:r>
-              <a:rPr lang="fr-FR" sz="7200" dirty="0"/>
-              <a:t> </a:t>
-            </a:r>
-            <a:r>
-              <a:rPr lang="fr-FR" sz="7200" dirty="0" err="1"/>
-              <a:t>threshold</a:t>
-            </a:r>
-            <a:r>
-              <a:rPr lang="fr-FR" sz="7200" dirty="0"/>
-              <a:t> percentage of data. </a:t>
-            </a:r>
-            <a:r>
-              <a:rPr lang="fr-FR" sz="7200" dirty="0" err="1"/>
-              <a:t>We</a:t>
-            </a:r>
-            <a:r>
-              <a:rPr lang="fr-FR" sz="7200" dirty="0"/>
-              <a:t> use 10%. </a:t>
-            </a:r>
-          </a:p>
-          <a:p>
-            <a:pPr marL="857250" indent="-857250" algn="l">
-              <a:buFont typeface="Arial" panose="020B0604020202020204" pitchFamily="34" charset="0"/>
-              <a:buChar char="•"/>
-            </a:pPr>
-            <a:r>
-              <a:rPr lang="fr-FR" sz="7200" dirty="0"/>
-              <a:t>Regex </a:t>
-            </a:r>
-            <a:r>
-              <a:rPr lang="fr-FR" sz="7200" dirty="0" err="1"/>
-              <a:t>cleaning</a:t>
-            </a:r>
-            <a:r>
-              <a:rPr lang="fr-FR" sz="7200" dirty="0"/>
-              <a:t> of data. </a:t>
-            </a:r>
-          </a:p>
-          <a:p>
-            <a:pPr marL="857250" indent="-857250" algn="l">
-              <a:buFont typeface="Arial" panose="020B0604020202020204" pitchFamily="34" charset="0"/>
-              <a:buChar char="•"/>
-            </a:pPr>
-            <a:r>
-              <a:rPr lang="fr-FR" sz="7200" dirty="0" err="1"/>
-              <a:t>Spelling</a:t>
-            </a:r>
-            <a:r>
-              <a:rPr lang="fr-FR" sz="7200" dirty="0"/>
-              <a:t> </a:t>
-            </a:r>
-            <a:r>
-              <a:rPr lang="fr-FR" sz="7200" dirty="0" err="1"/>
-              <a:t>mistakes</a:t>
-            </a:r>
-            <a:r>
-              <a:rPr lang="fr-FR" sz="7200" dirty="0"/>
-              <a:t> </a:t>
-            </a:r>
-            <a:r>
-              <a:rPr lang="fr-FR" sz="7200" dirty="0" err="1"/>
-              <a:t>cleaning</a:t>
-            </a:r>
-            <a:r>
-              <a:rPr lang="fr-FR" sz="7200" dirty="0"/>
-              <a:t>: clean </a:t>
-            </a:r>
-            <a:r>
-              <a:rPr lang="fr-FR" sz="7200" dirty="0" err="1"/>
-              <a:t>those</a:t>
-            </a:r>
-            <a:r>
-              <a:rPr lang="fr-FR" sz="7200" dirty="0"/>
-              <a:t> </a:t>
-            </a:r>
-            <a:r>
-              <a:rPr lang="fr-FR" sz="7200" dirty="0" err="1"/>
-              <a:t>we</a:t>
-            </a:r>
-            <a:r>
-              <a:rPr lang="fr-FR" sz="7200" dirty="0"/>
-              <a:t> </a:t>
-            </a:r>
-            <a:r>
-              <a:rPr lang="fr-FR" sz="7200" dirty="0" err="1"/>
-              <a:t>saw</a:t>
-            </a:r>
-            <a:r>
-              <a:rPr lang="fr-FR" sz="7200" dirty="0"/>
-              <a:t> </a:t>
-            </a:r>
-            <a:r>
-              <a:rPr lang="fr-FR" sz="7200" dirty="0" err="1"/>
-              <a:t>mistakes</a:t>
-            </a:r>
-            <a:r>
-              <a:rPr lang="fr-FR" sz="7200" dirty="0"/>
-              <a:t> in. </a:t>
-            </a:r>
-            <a:r>
-              <a:rPr lang="fr-FR" sz="7200" dirty="0" err="1"/>
-              <a:t>Unfortunately</a:t>
-            </a:r>
-            <a:r>
-              <a:rPr lang="fr-FR" sz="7200" dirty="0"/>
-              <a:t> </a:t>
-            </a:r>
-            <a:r>
-              <a:rPr lang="fr-FR" sz="7200" dirty="0" err="1"/>
-              <a:t>they’re</a:t>
-            </a:r>
-            <a:r>
-              <a:rPr lang="fr-FR" sz="7200" dirty="0"/>
-              <a:t> not </a:t>
-            </a:r>
-            <a:r>
-              <a:rPr lang="fr-FR" sz="7200" dirty="0" err="1"/>
-              <a:t>necessarily</a:t>
-            </a:r>
-            <a:r>
-              <a:rPr lang="fr-FR" sz="7200" dirty="0"/>
-              <a:t> all the </a:t>
-            </a:r>
-            <a:r>
-              <a:rPr lang="fr-FR" sz="7200" dirty="0" err="1"/>
-              <a:t>mistakes</a:t>
-            </a:r>
-            <a:r>
-              <a:rPr lang="fr-FR" sz="7200" dirty="0"/>
-              <a:t> made in the files.</a:t>
-            </a:r>
-          </a:p>
-          <a:p>
-            <a:pPr marL="857250" indent="-857250" algn="l">
-              <a:buFont typeface="Arial" panose="020B0604020202020204" pitchFamily="34" charset="0"/>
-              <a:buChar char="•"/>
-            </a:pPr>
-            <a:r>
-              <a:rPr lang="fr-FR" sz="7200" dirty="0"/>
-              <a:t>British to American </a:t>
-            </a:r>
-            <a:r>
-              <a:rPr lang="fr-FR" sz="7200" dirty="0" err="1"/>
-              <a:t>english</a:t>
-            </a:r>
-            <a:r>
-              <a:rPr lang="fr-FR" sz="7200" dirty="0"/>
-              <a:t>: « </a:t>
-            </a:r>
-            <a:r>
-              <a:rPr lang="fr-FR" sz="7200" dirty="0" err="1"/>
-              <a:t>color</a:t>
-            </a:r>
-            <a:r>
-              <a:rPr lang="fr-FR" sz="7200" dirty="0"/>
-              <a:t> » and « </a:t>
-            </a:r>
-            <a:r>
-              <a:rPr lang="fr-FR" sz="7200" dirty="0" err="1"/>
-              <a:t>colour</a:t>
-            </a:r>
-            <a:r>
-              <a:rPr lang="fr-FR" sz="7200" dirty="0"/>
-              <a:t> » </a:t>
-            </a:r>
-            <a:r>
-              <a:rPr lang="fr-FR" sz="7200" dirty="0" err="1"/>
-              <a:t>should</a:t>
-            </a:r>
-            <a:r>
-              <a:rPr lang="fr-FR" sz="7200" dirty="0"/>
-              <a:t> have the </a:t>
-            </a:r>
-            <a:r>
-              <a:rPr lang="fr-FR" sz="7200" dirty="0" err="1"/>
-              <a:t>same</a:t>
-            </a:r>
-            <a:r>
-              <a:rPr lang="fr-FR" sz="7200" dirty="0"/>
-              <a:t> </a:t>
-            </a:r>
-            <a:r>
-              <a:rPr lang="fr-FR" sz="7200" dirty="0" err="1"/>
-              <a:t>meaning</a:t>
-            </a:r>
-            <a:r>
-              <a:rPr lang="fr-FR" sz="7200" dirty="0"/>
-              <a:t> </a:t>
-            </a:r>
-            <a:r>
-              <a:rPr lang="fr-FR" sz="7200" dirty="0" err="1"/>
-              <a:t>with</a:t>
-            </a:r>
-            <a:r>
-              <a:rPr lang="fr-FR" sz="7200" dirty="0"/>
-              <a:t> </a:t>
-            </a:r>
-            <a:r>
-              <a:rPr lang="fr-FR" sz="7200" dirty="0" err="1"/>
-              <a:t>same</a:t>
-            </a:r>
-            <a:r>
-              <a:rPr lang="fr-FR" sz="7200" dirty="0"/>
-              <a:t> </a:t>
-            </a:r>
-            <a:r>
-              <a:rPr lang="fr-FR" sz="7200" dirty="0" err="1"/>
-              <a:t>embeddings</a:t>
-            </a:r>
-            <a:r>
-              <a:rPr lang="fr-FR" sz="7200" dirty="0"/>
-              <a:t>, </a:t>
-            </a:r>
-            <a:r>
-              <a:rPr lang="fr-FR" sz="7200" dirty="0" err="1"/>
-              <a:t>so</a:t>
-            </a:r>
-            <a:r>
-              <a:rPr lang="fr-FR" sz="7200" dirty="0"/>
-              <a:t> </a:t>
-            </a:r>
-            <a:r>
-              <a:rPr lang="fr-FR" sz="7200" dirty="0" err="1"/>
-              <a:t>convert</a:t>
-            </a:r>
-            <a:r>
-              <a:rPr lang="fr-FR" sz="7200" dirty="0"/>
-              <a:t> </a:t>
-            </a:r>
-            <a:r>
-              <a:rPr lang="fr-FR" sz="7200" dirty="0" err="1"/>
-              <a:t>everything</a:t>
-            </a:r>
-            <a:r>
-              <a:rPr lang="fr-FR" sz="7200" dirty="0"/>
-              <a:t> </a:t>
-            </a:r>
-            <a:r>
-              <a:rPr lang="fr-FR" sz="7200" dirty="0" err="1"/>
-              <a:t>that</a:t>
-            </a:r>
-            <a:r>
-              <a:rPr lang="fr-FR" sz="7200" dirty="0"/>
-              <a:t> </a:t>
-            </a:r>
-            <a:r>
-              <a:rPr lang="fr-FR" sz="7200" dirty="0" err="1"/>
-              <a:t>conflicts</a:t>
-            </a:r>
-            <a:r>
-              <a:rPr lang="fr-FR" sz="7200" dirty="0"/>
-              <a:t> to one of </a:t>
-            </a:r>
-            <a:r>
-              <a:rPr lang="fr-FR" sz="7200" dirty="0" err="1"/>
-              <a:t>it</a:t>
-            </a:r>
-            <a:r>
-              <a:rPr lang="fr-FR" sz="7200" dirty="0"/>
-              <a:t>. </a:t>
-            </a:r>
-          </a:p>
-          <a:p>
-            <a:endParaRPr lang="en-US" sz="6600" dirty="0">
-              <a:solidFill>
-                <a:srgbClr val="FF6600"/>
-              </a:solidFill>
-            </a:endParaRPr>
-          </a:p>
-        </p:txBody>
-      </p:sp>
     </p:spTree>
     <p:extLst>
       <p:ext uri="{BB962C8B-B14F-4D97-AF65-F5344CB8AC3E}">
-        <p14:creationId xmlns:p14="http://schemas.microsoft.com/office/powerpoint/2010/main" val="116821060"/>
+        <p14:creationId xmlns:p14="http://schemas.microsoft.com/office/powerpoint/2010/main" val="1361275693"/>
       </p:ext>
     </p:extLst>
   </p:cSld>
@@ -3994,7 +4818,7 @@
                   <a:srgbClr val="FF6600"/>
                 </a:solidFill>
               </a:rPr>
-              <a:t>Model: AWD-LSTM[1]</a:t>
+              <a:t>Preprocessing</a:t>
             </a:r>
           </a:p>
         </p:txBody>
@@ -4063,150 +4887,88 @@
           </a:bodyPr>
           <a:lstStyle/>
           <a:p>
-            <a:pPr marL="857250" indent="-857250" algn="l">
+            <a:pPr algn="l"/>
+            <a:r>
+              <a:rPr lang="en-US" sz="2900" dirty="0"/>
+              <a:t>These are preprocessing pipelines in order.</a:t>
+            </a:r>
+          </a:p>
+          <a:p>
+            <a:pPr marL="457200" indent="-457200" algn="l">
               <a:buFont typeface="Arial" panose="020B0604020202020204" pitchFamily="34" charset="0"/>
               <a:buChar char="•"/>
             </a:pPr>
             <a:r>
-              <a:rPr lang="fr-FR" sz="2900" dirty="0"/>
-              <a:t>Uses </a:t>
-            </a:r>
-            <a:r>
-              <a:rPr lang="fr-FR" sz="2900" dirty="0" err="1"/>
-              <a:t>DropConnect</a:t>
-            </a:r>
-            <a:r>
-              <a:rPr lang="fr-FR" sz="2900" dirty="0"/>
-              <a:t> and a variant of </a:t>
-            </a:r>
-            <a:r>
-              <a:rPr lang="fr-FR" sz="2900" dirty="0" err="1"/>
-              <a:t>Average</a:t>
-            </a:r>
-            <a:r>
-              <a:rPr lang="fr-FR" sz="2900" dirty="0"/>
-              <a:t>-SGD (NT-ASGD) </a:t>
-            </a:r>
-            <a:r>
-              <a:rPr lang="fr-FR" sz="2900" dirty="0" err="1"/>
-              <a:t>along</a:t>
-            </a:r>
-            <a:r>
-              <a:rPr lang="fr-FR" sz="2900" dirty="0"/>
-              <a:t> </a:t>
-            </a:r>
-            <a:r>
-              <a:rPr lang="fr-FR" sz="2900" dirty="0" err="1"/>
-              <a:t>with</a:t>
-            </a:r>
-            <a:r>
-              <a:rPr lang="fr-FR" sz="2900" dirty="0"/>
-              <a:t> </a:t>
-            </a:r>
-            <a:r>
-              <a:rPr lang="fr-FR" sz="2900" dirty="0" err="1"/>
-              <a:t>several</a:t>
-            </a:r>
-            <a:r>
-              <a:rPr lang="fr-FR" sz="2900" dirty="0"/>
-              <a:t> </a:t>
-            </a:r>
-            <a:r>
-              <a:rPr lang="fr-FR" sz="2900" dirty="0" err="1"/>
-              <a:t>other</a:t>
-            </a:r>
-            <a:r>
-              <a:rPr lang="fr-FR" sz="2900" dirty="0"/>
-              <a:t> </a:t>
-            </a:r>
-            <a:r>
-              <a:rPr lang="fr-FR" sz="2900" dirty="0" err="1"/>
-              <a:t>regularization</a:t>
-            </a:r>
-            <a:r>
-              <a:rPr lang="fr-FR" sz="2900" dirty="0"/>
-              <a:t> techniques. </a:t>
-            </a:r>
-          </a:p>
-          <a:p>
-            <a:pPr marL="857250" indent="-857250" algn="l">
+              <a:rPr lang="en-US" sz="2900" dirty="0"/>
+              <a:t>Regex Cleaning</a:t>
+            </a:r>
+          </a:p>
+          <a:p>
+            <a:pPr marL="457200" indent="-457200" algn="l">
               <a:buFont typeface="Arial" panose="020B0604020202020204" pitchFamily="34" charset="0"/>
               <a:buChar char="•"/>
             </a:pPr>
             <a:r>
-              <a:rPr lang="fr-FR" sz="2900" dirty="0"/>
-              <a:t>Default of </a:t>
-            </a:r>
-            <a:r>
-              <a:rPr lang="fr-FR" sz="2900" dirty="0" err="1"/>
-              <a:t>fastai’s</a:t>
-            </a:r>
-            <a:r>
-              <a:rPr lang="fr-FR" sz="2900" dirty="0"/>
-              <a:t> NLP model and </a:t>
-            </a:r>
-            <a:r>
-              <a:rPr lang="fr-FR" sz="2900" dirty="0" err="1"/>
-              <a:t>was</a:t>
-            </a:r>
-            <a:r>
-              <a:rPr lang="fr-FR" sz="2900" dirty="0"/>
-              <a:t> state of the art </a:t>
-            </a:r>
-            <a:r>
-              <a:rPr lang="fr-FR" sz="2900" dirty="0" err="1"/>
-              <a:t>three</a:t>
-            </a:r>
-            <a:r>
-              <a:rPr lang="fr-FR" sz="2900" dirty="0"/>
-              <a:t> </a:t>
-            </a:r>
-            <a:r>
-              <a:rPr lang="fr-FR" sz="2900" dirty="0" err="1"/>
-              <a:t>years</a:t>
-            </a:r>
-            <a:r>
-              <a:rPr lang="fr-FR" sz="2900" dirty="0"/>
-              <a:t> </a:t>
-            </a:r>
-            <a:r>
-              <a:rPr lang="fr-FR" sz="2900" dirty="0" err="1"/>
-              <a:t>ago</a:t>
-            </a:r>
-            <a:r>
-              <a:rPr lang="fr-FR" sz="2900" dirty="0"/>
-              <a:t>, </a:t>
-            </a:r>
-            <a:r>
-              <a:rPr lang="fr-FR" sz="2900" dirty="0" err="1"/>
-              <a:t>giving</a:t>
-            </a:r>
-            <a:r>
-              <a:rPr lang="fr-FR" sz="2900" dirty="0"/>
-              <a:t> acceptable </a:t>
-            </a:r>
-            <a:r>
-              <a:rPr lang="fr-FR" sz="2900" dirty="0" err="1"/>
-              <a:t>results</a:t>
-            </a:r>
-            <a:r>
-              <a:rPr lang="fr-FR" sz="2900" dirty="0"/>
-              <a:t>. </a:t>
-            </a:r>
-          </a:p>
-          <a:p>
-            <a:endParaRPr lang="en-US" sz="6600" dirty="0">
-              <a:solidFill>
-                <a:srgbClr val="FF6600"/>
-              </a:solidFill>
-            </a:endParaRPr>
+              <a:rPr lang="en-US" sz="2900" dirty="0"/>
+              <a:t>Tokenizers</a:t>
+            </a:r>
+          </a:p>
+          <a:p>
+            <a:pPr marL="914400" lvl="1" indent="-457200" algn="l">
+              <a:buFont typeface="Arial" panose="020B0604020202020204" pitchFamily="34" charset="0"/>
+              <a:buChar char="•"/>
+            </a:pPr>
+            <a:r>
+              <a:rPr lang="en-US" sz="2500" dirty="0"/>
+              <a:t>Removal of stop words</a:t>
+            </a:r>
+          </a:p>
+          <a:p>
+            <a:pPr marL="914400" lvl="1" indent="-457200" algn="l">
+              <a:buFont typeface="Arial" panose="020B0604020202020204" pitchFamily="34" charset="0"/>
+              <a:buChar char="•"/>
+            </a:pPr>
+            <a:r>
+              <a:rPr lang="en-US" sz="2500" dirty="0"/>
+              <a:t>Lemmatization</a:t>
+            </a:r>
+          </a:p>
+          <a:p>
+            <a:pPr marL="457200" indent="-457200" algn="l">
+              <a:buFont typeface="Arial" panose="020B0604020202020204" pitchFamily="34" charset="0"/>
+              <a:buChar char="•"/>
+            </a:pPr>
+            <a:r>
+              <a:rPr lang="en-US" sz="2900" dirty="0"/>
+              <a:t>Restricting the result from tokenizers to be between a range (used 3 – 15 words for its length)</a:t>
+            </a:r>
+          </a:p>
+          <a:p>
+            <a:pPr marL="457200" indent="-457200" algn="l">
+              <a:buFont typeface="Arial" panose="020B0604020202020204" pitchFamily="34" charset="0"/>
+              <a:buChar char="•"/>
+            </a:pPr>
+            <a:r>
+              <a:rPr lang="en-US" sz="2900" dirty="0"/>
+              <a:t>Count Vectorizer transformation.</a:t>
+            </a:r>
+          </a:p>
+          <a:p>
+            <a:pPr marL="457200" indent="-457200" algn="l">
+              <a:buFont typeface="Arial" panose="020B0604020202020204" pitchFamily="34" charset="0"/>
+              <a:buChar char="•"/>
+            </a:pPr>
+            <a:r>
+              <a:rPr lang="en-US" sz="2900" dirty="0"/>
+              <a:t>TF-IDF transformation. </a:t>
+            </a:r>
           </a:p>
         </p:txBody>
       </p:sp>
     </p:spTree>
     <p:extLst>
       <p:ext uri="{BB962C8B-B14F-4D97-AF65-F5344CB8AC3E}">
-        <p14:creationId xmlns:p14="http://schemas.microsoft.com/office/powerpoint/2010/main" val="2136202155"/>
+        <p14:creationId xmlns:p14="http://schemas.microsoft.com/office/powerpoint/2010/main" val="1301842805"/>
       </p:ext>
     </p:extLst>
   </p:cSld>
@@ -4268,21 +5030,8 @@
                   <a:srgbClr val="FF6600"/>
                 </a:solidFill>
               </a:rPr>
-              <a:t>Training Method: </a:t>
-            </a:r>
-            <a:r>
-              <a:rPr lang="en-US" b="1" dirty="0" err="1">
-                <a:solidFill>
-                  <a:srgbClr val="FF6600"/>
-                </a:solidFill>
-              </a:rPr>
-              <a:t>ULMFiT</a:t>
-            </a:r>
-            <a:endParaRPr lang="en-US" b="1" dirty="0">
-              <a:solidFill>
-                <a:srgbClr val="FF6600"/>
-              </a:solidFill>
-            </a:endParaRPr>
+              <a:t>Models</a:t>
+            </a:r>
           </a:p>
         </p:txBody>
       </p:sp>
@@ -4355,28 +5104,8 @@
               <a:buChar char="•"/>
             </a:pPr>
             <a:r>
-              <a:rPr lang="fr-FR" sz="2900" dirty="0" err="1"/>
-              <a:t>Three</a:t>
-            </a:r>
-            <a:r>
-              <a:rPr lang="fr-FR" sz="2900" dirty="0"/>
-              <a:t> </a:t>
-            </a:r>
-            <a:r>
-              <a:rPr lang="fr-FR" sz="2900" dirty="0" err="1"/>
-              <a:t>steps</a:t>
-            </a:r>
-            <a:r>
-              <a:rPr lang="fr-FR" sz="2900" dirty="0"/>
-              <a:t> for </a:t>
-            </a:r>
-            <a:r>
-              <a:rPr lang="fr-FR" sz="2900" dirty="0" err="1"/>
-              <a:t>ULMFiT</a:t>
-            </a:r>
-            <a:r>
-              <a:rPr lang="fr-FR" sz="2900" dirty="0"/>
-              <a:t> are: </a:t>
+              <a:rPr lang="en-US" sz="2900" dirty="0"/>
+              <a:t>Random Forest Classifier acquires 0.75 accuracy with default configurations.</a:t>
             </a:r>
           </a:p>
           <a:p>
@@ -4385,32 +5114,8 @@
               <a:buChar char="•"/>
             </a:pPr>
             <a:r>
-              <a:rPr lang="fr-FR" sz="2900" dirty="0"/>
-              <a:t>AWD-LSTM </a:t>
-            </a:r>
-            <a:r>
-              <a:rPr lang="fr-FR" sz="2900" dirty="0" err="1"/>
-              <a:t>pretrained</a:t>
-            </a:r>
-            <a:r>
-              <a:rPr lang="fr-FR" sz="2900" dirty="0"/>
-              <a:t> on WikiText-103 corpus (made </a:t>
-            </a:r>
-            <a:r>
-              <a:rPr lang="fr-FR" sz="2900" dirty="0" err="1"/>
-              <a:t>available</a:t>
-            </a:r>
-            <a:r>
-              <a:rPr lang="fr-FR" sz="2900" dirty="0"/>
-              <a:t> </a:t>
-            </a:r>
-            <a:r>
-              <a:rPr lang="fr-FR" sz="2900" dirty="0" err="1"/>
-              <a:t>already</a:t>
-            </a:r>
-            <a:r>
-              <a:rPr lang="fr-FR" sz="2900" dirty="0"/>
-              <a:t>). </a:t>
+              <a:rPr lang="en-US" sz="2900" dirty="0"/>
+              <a:t>K-nearest neighbor classifier with number of neighbors = 3 and weights = “distance” achieves 0.45 accuracy.</a:t>
             </a:r>
           </a:p>
           <a:p>
@@ -4419,84 +5124,8 @@
               <a:buChar char="•"/>
             </a:pPr>
             <a:r>
-              <a:rPr lang="fr-FR" sz="2900" dirty="0"/>
-              <a:t>(</a:t>
-            </a:r>
-            <a:r>
-              <a:rPr lang="fr-FR" sz="2900" b="1" dirty="0" err="1"/>
-              <a:t>Pretraining</a:t>
-            </a:r>
-            <a:r>
-              <a:rPr lang="fr-FR" sz="2900" b="1" dirty="0"/>
-              <a:t> stage</a:t>
-            </a:r>
-            <a:r>
-              <a:rPr lang="fr-FR" sz="2900" dirty="0"/>
-              <a:t>) Transfer </a:t>
-            </a:r>
-            <a:r>
-              <a:rPr lang="fr-FR" sz="2900" dirty="0" err="1"/>
-              <a:t>learning</a:t>
-            </a:r>
-            <a:r>
-              <a:rPr lang="fr-FR" sz="2900" dirty="0"/>
-              <a:t> to </a:t>
-            </a:r>
-            <a:r>
-              <a:rPr lang="fr-FR" sz="2900" dirty="0" err="1"/>
-              <a:t>your</a:t>
-            </a:r>
-            <a:r>
-              <a:rPr lang="fr-FR" sz="2900" dirty="0"/>
-              <a:t> corpus of </a:t>
-            </a:r>
-            <a:r>
-              <a:rPr lang="fr-FR" sz="2900" dirty="0" err="1"/>
-              <a:t>words</a:t>
-            </a:r>
-            <a:r>
-              <a:rPr lang="fr-FR" sz="2900" dirty="0"/>
-              <a:t> (corpus </a:t>
-            </a:r>
-            <a:r>
-              <a:rPr lang="fr-FR" sz="2900" dirty="0" err="1"/>
-              <a:t>predict</a:t>
-            </a:r>
-            <a:r>
-              <a:rPr lang="fr-FR" sz="2900" dirty="0"/>
-              <a:t> </a:t>
-            </a:r>
-            <a:r>
-              <a:rPr lang="fr-FR" sz="2900" dirty="0" err="1"/>
-              <a:t>what</a:t>
-            </a:r>
-            <a:r>
-              <a:rPr lang="fr-FR" sz="2900" dirty="0"/>
-              <a:t> the </a:t>
-            </a:r>
-            <a:r>
-              <a:rPr lang="fr-FR" sz="2900" dirty="0" err="1"/>
-              <a:t>next</a:t>
-            </a:r>
-            <a:r>
-              <a:rPr lang="fr-FR" sz="2900" dirty="0"/>
-              <a:t> </a:t>
-            </a:r>
-            <a:r>
-              <a:rPr lang="fr-FR" sz="2900" dirty="0" err="1"/>
-              <a:t>word</a:t>
-            </a:r>
-            <a:r>
-              <a:rPr lang="fr-FR" sz="2900" dirty="0"/>
-              <a:t> </a:t>
-            </a:r>
-            <a:r>
-              <a:rPr lang="fr-FR" sz="2900" dirty="0" err="1"/>
-              <a:t>is</a:t>
-            </a:r>
-            <a:r>
-              <a:rPr lang="fr-FR" sz="2900" dirty="0"/>
-              <a:t>). </a:t>
+              <a:rPr lang="en-US" sz="2900" dirty="0"/>
+              <a:t>Grid-search CV which ensemble TF-IDF Vectorizer and KNN gives score of 0.26. </a:t>
             </a:r>
           </a:p>
           <a:p>
@@ -4504,72 +5133,14 @@
               <a:buFont typeface="Arial" panose="020B0604020202020204" pitchFamily="34" charset="0"/>
               <a:buChar char="•"/>
             </a:pPr>
-            <a:r>
-              <a:rPr lang="fr-FR" sz="2900" dirty="0" err="1"/>
-              <a:t>Remove</a:t>
-            </a:r>
-            <a:r>
-              <a:rPr lang="fr-FR" sz="2900" dirty="0"/>
-              <a:t> the </a:t>
-            </a:r>
-            <a:r>
-              <a:rPr lang="fr-FR" sz="2900" dirty="0" err="1"/>
-              <a:t>head</a:t>
-            </a:r>
-            <a:r>
-              <a:rPr lang="fr-FR" sz="2900" dirty="0"/>
-              <a:t> and replace </a:t>
-            </a:r>
-            <a:r>
-              <a:rPr lang="fr-FR" sz="2900" dirty="0" err="1"/>
-              <a:t>it</a:t>
-            </a:r>
-            <a:r>
-              <a:rPr lang="fr-FR" sz="2900" dirty="0"/>
-              <a:t> </a:t>
-            </a:r>
-            <a:r>
-              <a:rPr lang="fr-FR" sz="2900" dirty="0" err="1"/>
-              <a:t>with</a:t>
-            </a:r>
-            <a:r>
-              <a:rPr lang="fr-FR" sz="2900" dirty="0"/>
-              <a:t> classification </a:t>
-            </a:r>
-            <a:r>
-              <a:rPr lang="fr-FR" sz="2900" dirty="0" err="1"/>
-              <a:t>head</a:t>
-            </a:r>
-            <a:r>
-              <a:rPr lang="fr-FR" sz="2900" dirty="0"/>
-              <a:t>, and train for classification </a:t>
-            </a:r>
-            <a:r>
-              <a:rPr lang="fr-FR" sz="2900" dirty="0" err="1"/>
-              <a:t>task</a:t>
-            </a:r>
-            <a:r>
-              <a:rPr lang="fr-FR" sz="2900" dirty="0"/>
-              <a:t>. </a:t>
-            </a:r>
-          </a:p>
-          <a:p>
-            <a:pPr marL="457200" indent="-457200" algn="l">
-              <a:buFont typeface="Arial" panose="020B0604020202020204" pitchFamily="34" charset="0"/>
-              <a:buChar char="•"/>
-            </a:pPr>
-            <a:endParaRPr lang="en-US" sz="2900" dirty="0">
-              <a:solidFill>
-                <a:srgbClr val="FF6600"/>
-              </a:solidFill>
-            </a:endParaRPr>
+            <a:endParaRPr lang="en-US" sz="2900" dirty="0"/>
           </a:p>
         </p:txBody>
       </p:sp>
     </p:spTree>
     <p:extLst>
       <p:ext uri="{BB962C8B-B14F-4D97-AF65-F5344CB8AC3E}">
-        <p14:creationId xmlns:p14="http://schemas.microsoft.com/office/powerpoint/2010/main" val="1033785101"/>
+        <p14:creationId xmlns:p14="http://schemas.microsoft.com/office/powerpoint/2010/main" val="1666680693"/>
       </p:ext>
     </p:extLst>
   </p:cSld>
@@ -4614,8 +5185,8 @@
         </p:nvSpPr>
         <p:spPr>
           <a:xfrm rot="5400000">
-            <a:off x="-562431" y="562430"/>
-            <a:ext cx="6858002" cy="5733142"/>
+            <a:off x="2666998" y="-2667000"/>
+            <a:ext cx="6858002" cy="12192001"/>
           </a:xfrm>
           <a:solidFill>
             <a:srgbClr val="3B3B3B"/>
@@ -4625,13 +5196,22 @@
           <a:bodyPr vert="vert270" anchor="t" anchorCtr="0"/>
           <a:lstStyle/>
           <a:p>
+            <a:br>
+              <a:rPr lang="en-US" dirty="0"/>
+            </a:br>
+            <a:br>
+              <a:rPr lang="en-US" dirty="0"/>
+            </a:br>
+            <a:br>
+              <a:rPr lang="en-US" dirty="0"/>
+            </a:br>
             <a:r>
               <a:rPr lang="en-US" b="1" dirty="0">
                 <a:solidFill>
                   <a:srgbClr val="FF6600"/>
                 </a:solidFill>
               </a:rPr>
-              <a:t>Pretraining Stage</a:t>
+              <a:t>Advanced Model</a:t>
             </a:r>
           </a:p>
         </p:txBody>
@@ -4672,538 +5252,10 @@
           </a:prstGeom>
         </p:spPr>
       </p:pic>
-      <p:sp>
-        <p:nvSpPr>
-          <p:cNvPr id="6" name="Subtitle 5">
-            <a:extLst>
-              <a:ext uri="{FF2B5EF4-FFF2-40B4-BE49-F238E27FC236}">
-                <a16:creationId xmlns:a16="http://schemas.microsoft.com/office/drawing/2014/main" id="{2D4BA697-580E-5544-8F2F-194AD99B859F}"/>
-              </a:ext>
-            </a:extLst>
-          </p:cNvPr>
-          <p:cNvSpPr>
-            <a:spLocks noGrp="1"/>
-          </p:cNvSpPr>
-          <p:nvPr>
-            <p:ph type="subTitle" idx="1"/>
-          </p:nvPr>
-        </p:nvSpPr>
-        <p:spPr>
-          <a:xfrm>
-            <a:off x="5837274" y="0"/>
-            <a:ext cx="6354726" cy="6858000"/>
-          </a:xfrm>
-        </p:spPr>
-        <p:txBody>
-          <a:bodyPr>
-            <a:noAutofit/>
-          </a:bodyPr>
-          <a:lstStyle/>
-          <a:p>
-            <a:pPr marL="857250" indent="-857250" algn="l">
-              <a:buFont typeface="Arial" panose="020B0604020202020204" pitchFamily="34" charset="0"/>
-              <a:buChar char="•"/>
-            </a:pPr>
-            <a:r>
-              <a:rPr lang="fr-FR" dirty="0"/>
-              <a:t>Train a few </a:t>
-            </a:r>
-            <a:r>
-              <a:rPr lang="fr-FR" dirty="0" err="1"/>
-              <a:t>epoch</a:t>
-            </a:r>
-            <a:r>
-              <a:rPr lang="fr-FR" dirty="0"/>
-              <a:t>. </a:t>
-            </a:r>
-            <a:r>
-              <a:rPr lang="fr-FR" b="1" dirty="0"/>
-              <a:t>Not </a:t>
-            </a:r>
-            <a:r>
-              <a:rPr lang="fr-FR" b="1" dirty="0" err="1"/>
-              <a:t>required</a:t>
-            </a:r>
-            <a:r>
-              <a:rPr lang="fr-FR" b="1" dirty="0"/>
-              <a:t> for best </a:t>
-            </a:r>
-            <a:r>
-              <a:rPr lang="fr-FR" b="1" dirty="0" err="1"/>
-              <a:t>accuracy</a:t>
-            </a:r>
-            <a:r>
-              <a:rPr lang="fr-FR" dirty="0"/>
-              <a:t>. </a:t>
-            </a:r>
-            <a:r>
-              <a:rPr lang="fr-FR" dirty="0" err="1"/>
-              <a:t>We</a:t>
-            </a:r>
-            <a:r>
-              <a:rPr lang="fr-FR" dirty="0"/>
-              <a:t> </a:t>
-            </a:r>
-            <a:r>
-              <a:rPr lang="fr-FR" dirty="0" err="1"/>
-              <a:t>only</a:t>
-            </a:r>
-            <a:r>
-              <a:rPr lang="fr-FR" dirty="0"/>
-              <a:t> </a:t>
-            </a:r>
-            <a:r>
-              <a:rPr lang="fr-FR" dirty="0" err="1"/>
-              <a:t>want</a:t>
-            </a:r>
-            <a:r>
-              <a:rPr lang="fr-FR" dirty="0"/>
-              <a:t> the body of the model to </a:t>
-            </a:r>
-            <a:r>
-              <a:rPr lang="fr-FR" dirty="0" err="1"/>
-              <a:t>get</a:t>
-            </a:r>
-            <a:r>
-              <a:rPr lang="fr-FR" dirty="0"/>
-              <a:t> </a:t>
-            </a:r>
-            <a:r>
-              <a:rPr lang="fr-FR" dirty="0" err="1"/>
-              <a:t>used</a:t>
-            </a:r>
-            <a:r>
-              <a:rPr lang="fr-FR" dirty="0"/>
-              <a:t> to </a:t>
-            </a:r>
-            <a:r>
-              <a:rPr lang="fr-FR" dirty="0" err="1"/>
-              <a:t>our</a:t>
-            </a:r>
-            <a:r>
-              <a:rPr lang="fr-FR" dirty="0"/>
-              <a:t> corpus of </a:t>
-            </a:r>
-            <a:r>
-              <a:rPr lang="fr-FR" dirty="0" err="1"/>
-              <a:t>words</a:t>
-            </a:r>
-            <a:r>
-              <a:rPr lang="fr-FR" dirty="0"/>
-              <a:t>, not </a:t>
-            </a:r>
-            <a:r>
-              <a:rPr lang="fr-FR" dirty="0" err="1"/>
-              <a:t>necessarily</a:t>
-            </a:r>
-            <a:r>
-              <a:rPr lang="fr-FR" dirty="0"/>
-              <a:t> to </a:t>
-            </a:r>
-            <a:r>
-              <a:rPr lang="fr-FR" dirty="0" err="1"/>
-              <a:t>predict</a:t>
-            </a:r>
-            <a:r>
-              <a:rPr lang="fr-FR" dirty="0"/>
-              <a:t> the </a:t>
-            </a:r>
-            <a:r>
-              <a:rPr lang="fr-FR" dirty="0" err="1"/>
-              <a:t>next</a:t>
-            </a:r>
-            <a:r>
-              <a:rPr lang="fr-FR" dirty="0"/>
-              <a:t> </a:t>
-            </a:r>
-            <a:r>
-              <a:rPr lang="fr-FR" dirty="0" err="1"/>
-              <a:t>word</a:t>
-            </a:r>
-            <a:r>
-              <a:rPr lang="fr-FR" dirty="0"/>
-              <a:t> </a:t>
-            </a:r>
-            <a:r>
-              <a:rPr lang="fr-FR" dirty="0" err="1"/>
-              <a:t>nor</a:t>
-            </a:r>
-            <a:r>
-              <a:rPr lang="fr-FR" dirty="0"/>
-              <a:t> </a:t>
-            </a:r>
-            <a:r>
-              <a:rPr lang="fr-FR" dirty="0" err="1"/>
-              <a:t>overfitting</a:t>
-            </a:r>
-            <a:r>
-              <a:rPr lang="fr-FR" dirty="0"/>
-              <a:t>. </a:t>
-            </a:r>
-          </a:p>
-          <a:p>
-            <a:pPr marL="857250" indent="-857250" algn="l">
-              <a:buFont typeface="Arial" panose="020B0604020202020204" pitchFamily="34" charset="0"/>
-              <a:buChar char="•"/>
-            </a:pPr>
-            <a:r>
-              <a:rPr lang="fr-FR" dirty="0" err="1"/>
-              <a:t>Better</a:t>
-            </a:r>
-            <a:r>
-              <a:rPr lang="fr-FR" dirty="0"/>
-              <a:t> </a:t>
-            </a:r>
-            <a:r>
-              <a:rPr lang="fr-FR" dirty="0" err="1"/>
-              <a:t>accuracy</a:t>
-            </a:r>
-            <a:r>
-              <a:rPr lang="fr-FR" dirty="0"/>
-              <a:t> </a:t>
-            </a:r>
-            <a:r>
-              <a:rPr lang="fr-FR" dirty="0" err="1"/>
-              <a:t>here</a:t>
-            </a:r>
-            <a:r>
-              <a:rPr lang="fr-FR" dirty="0"/>
-              <a:t> </a:t>
-            </a:r>
-            <a:r>
-              <a:rPr lang="fr-FR" dirty="0" err="1"/>
-              <a:t>doesn’t</a:t>
-            </a:r>
-            <a:r>
-              <a:rPr lang="fr-FR" dirty="0"/>
-              <a:t> </a:t>
-            </a:r>
-            <a:r>
-              <a:rPr lang="fr-FR" dirty="0" err="1"/>
-              <a:t>necessarily</a:t>
-            </a:r>
-            <a:r>
-              <a:rPr lang="fr-FR" dirty="0"/>
-              <a:t> </a:t>
-            </a:r>
-            <a:r>
-              <a:rPr lang="fr-FR" dirty="0" err="1"/>
-              <a:t>gives</a:t>
-            </a:r>
-            <a:r>
-              <a:rPr lang="fr-FR" dirty="0"/>
-              <a:t> </a:t>
-            </a:r>
-            <a:r>
-              <a:rPr lang="fr-FR" dirty="0" err="1"/>
-              <a:t>better</a:t>
-            </a:r>
-            <a:r>
-              <a:rPr lang="fr-FR" dirty="0"/>
-              <a:t> </a:t>
-            </a:r>
-            <a:r>
-              <a:rPr lang="fr-FR" dirty="0" err="1"/>
-              <a:t>accuracy</a:t>
-            </a:r>
-            <a:r>
-              <a:rPr lang="fr-FR" dirty="0"/>
-              <a:t> in classification </a:t>
-            </a:r>
-            <a:r>
-              <a:rPr lang="fr-FR" dirty="0" err="1"/>
-              <a:t>task</a:t>
-            </a:r>
-            <a:r>
-              <a:rPr lang="fr-FR" dirty="0"/>
-              <a:t> </a:t>
-            </a:r>
-            <a:r>
-              <a:rPr lang="fr-FR" dirty="0" err="1"/>
-              <a:t>downstream</a:t>
-            </a:r>
-            <a:r>
-              <a:rPr lang="fr-FR" dirty="0"/>
-              <a:t>. </a:t>
-            </a:r>
-            <a:r>
-              <a:rPr lang="fr-FR" dirty="0" err="1"/>
-              <a:t>However</a:t>
-            </a:r>
-            <a:r>
-              <a:rPr lang="fr-FR" dirty="0"/>
-              <a:t> </a:t>
-            </a:r>
-            <a:r>
-              <a:rPr lang="fr-FR" dirty="0" err="1"/>
-              <a:t>under</a:t>
-            </a:r>
-            <a:r>
-              <a:rPr lang="fr-FR" dirty="0"/>
-              <a:t>-training at </a:t>
-            </a:r>
-            <a:r>
-              <a:rPr lang="fr-FR" dirty="0" err="1"/>
-              <a:t>this</a:t>
-            </a:r>
-            <a:r>
-              <a:rPr lang="fr-FR" dirty="0"/>
-              <a:t> phase </a:t>
-            </a:r>
-            <a:r>
-              <a:rPr lang="fr-FR" dirty="0" err="1"/>
-              <a:t>might</a:t>
-            </a:r>
-            <a:r>
-              <a:rPr lang="fr-FR" dirty="0"/>
-              <a:t> </a:t>
-            </a:r>
-            <a:r>
-              <a:rPr lang="fr-FR" dirty="0" err="1"/>
-              <a:t>means</a:t>
-            </a:r>
-            <a:r>
-              <a:rPr lang="fr-FR" dirty="0"/>
-              <a:t> not </a:t>
-            </a:r>
-            <a:r>
-              <a:rPr lang="fr-FR" dirty="0" err="1"/>
-              <a:t>yet</a:t>
-            </a:r>
-            <a:r>
-              <a:rPr lang="fr-FR" dirty="0"/>
-              <a:t> warm up for classification </a:t>
-            </a:r>
-            <a:r>
-              <a:rPr lang="fr-FR" dirty="0" err="1"/>
-              <a:t>task</a:t>
-            </a:r>
-            <a:r>
-              <a:rPr lang="fr-FR" dirty="0"/>
-              <a:t>, </a:t>
-            </a:r>
-            <a:r>
-              <a:rPr lang="fr-FR" dirty="0" err="1"/>
-              <a:t>hence</a:t>
-            </a:r>
-            <a:r>
-              <a:rPr lang="fr-FR" dirty="0"/>
-              <a:t> </a:t>
-            </a:r>
-            <a:r>
-              <a:rPr lang="fr-FR" dirty="0" err="1"/>
-              <a:t>might</a:t>
-            </a:r>
-            <a:r>
-              <a:rPr lang="fr-FR" dirty="0"/>
-              <a:t> </a:t>
-            </a:r>
-            <a:r>
-              <a:rPr lang="fr-FR" dirty="0" err="1"/>
-              <a:t>give</a:t>
-            </a:r>
-            <a:r>
-              <a:rPr lang="fr-FR" dirty="0"/>
-              <a:t> </a:t>
-            </a:r>
-            <a:r>
-              <a:rPr lang="fr-FR" dirty="0" err="1"/>
-              <a:t>worse</a:t>
-            </a:r>
-            <a:r>
-              <a:rPr lang="fr-FR" dirty="0"/>
-              <a:t> classification </a:t>
-            </a:r>
-            <a:r>
-              <a:rPr lang="fr-FR" dirty="0" err="1"/>
-              <a:t>results</a:t>
-            </a:r>
-            <a:r>
-              <a:rPr lang="fr-FR" dirty="0"/>
-              <a:t> </a:t>
-            </a:r>
-            <a:r>
-              <a:rPr lang="fr-FR" dirty="0" err="1"/>
-              <a:t>downstream</a:t>
-            </a:r>
-            <a:r>
-              <a:rPr lang="fr-FR" dirty="0"/>
-              <a:t>.</a:t>
-            </a:r>
-          </a:p>
-          <a:p>
-            <a:pPr marL="857250" indent="-857250" algn="l">
-              <a:buFont typeface="Arial" panose="020B0604020202020204" pitchFamily="34" charset="0"/>
-              <a:buChar char="•"/>
-            </a:pPr>
-            <a:r>
-              <a:rPr lang="fr-FR" dirty="0" err="1"/>
-              <a:t>Depending</a:t>
-            </a:r>
-            <a:r>
-              <a:rPr lang="fr-FR" dirty="0"/>
-              <a:t> on </a:t>
-            </a:r>
-            <a:r>
-              <a:rPr lang="fr-FR" dirty="0" err="1"/>
-              <a:t>number</a:t>
-            </a:r>
-            <a:r>
-              <a:rPr lang="fr-FR" dirty="0"/>
-              <a:t> of </a:t>
-            </a:r>
-            <a:r>
-              <a:rPr lang="fr-FR" dirty="0" err="1"/>
-              <a:t>epochs</a:t>
-            </a:r>
-            <a:r>
-              <a:rPr lang="fr-FR" dirty="0"/>
-              <a:t> train, one manages to </a:t>
-            </a:r>
-            <a:r>
-              <a:rPr lang="fr-FR" dirty="0" err="1"/>
-              <a:t>get</a:t>
-            </a:r>
-            <a:r>
-              <a:rPr lang="fr-FR" dirty="0"/>
-              <a:t> about 0.33 for 3+1 </a:t>
-            </a:r>
-            <a:r>
-              <a:rPr lang="fr-FR" dirty="0" err="1"/>
-              <a:t>epochs</a:t>
-            </a:r>
-            <a:r>
-              <a:rPr lang="fr-FR" dirty="0"/>
-              <a:t> and about 0.34 for 10+1 </a:t>
-            </a:r>
-            <a:r>
-              <a:rPr lang="fr-FR" dirty="0" err="1"/>
-              <a:t>epochs</a:t>
-            </a:r>
-            <a:r>
-              <a:rPr lang="fr-FR" dirty="0"/>
-              <a:t>. </a:t>
-            </a:r>
-          </a:p>
-          <a:p>
-            <a:pPr marL="857250" indent="-857250" algn="l">
-              <a:buFont typeface="Arial" panose="020B0604020202020204" pitchFamily="34" charset="0"/>
-              <a:buChar char="•"/>
-            </a:pPr>
-            <a:r>
-              <a:rPr lang="fr-FR" dirty="0"/>
-              <a:t>+1 </a:t>
-            </a:r>
-            <a:r>
-              <a:rPr lang="fr-FR" dirty="0" err="1"/>
-              <a:t>because</a:t>
-            </a:r>
-            <a:r>
-              <a:rPr lang="fr-FR" dirty="0"/>
-              <a:t> 1 </a:t>
-            </a:r>
-            <a:r>
-              <a:rPr lang="fr-FR" dirty="0" err="1"/>
-              <a:t>additional</a:t>
-            </a:r>
-            <a:r>
-              <a:rPr lang="fr-FR" dirty="0"/>
-              <a:t> </a:t>
-            </a:r>
-            <a:r>
-              <a:rPr lang="fr-FR" dirty="0" err="1"/>
-              <a:t>epoch</a:t>
-            </a:r>
-            <a:r>
-              <a:rPr lang="fr-FR" dirty="0"/>
-              <a:t> </a:t>
-            </a:r>
-            <a:r>
-              <a:rPr lang="fr-FR" dirty="0" err="1"/>
-              <a:t>is</a:t>
-            </a:r>
-            <a:r>
-              <a:rPr lang="fr-FR" dirty="0"/>
-              <a:t> </a:t>
-            </a:r>
-            <a:r>
-              <a:rPr lang="fr-FR" dirty="0" err="1"/>
-              <a:t>trained</a:t>
-            </a:r>
-            <a:r>
-              <a:rPr lang="fr-FR" dirty="0"/>
-              <a:t> </a:t>
-            </a:r>
-            <a:r>
-              <a:rPr lang="fr-FR" dirty="0" err="1"/>
-              <a:t>with</a:t>
-            </a:r>
-            <a:r>
-              <a:rPr lang="fr-FR" dirty="0"/>
-              <a:t> the model </a:t>
-            </a:r>
-            <a:r>
-              <a:rPr lang="fr-FR" dirty="0" err="1"/>
-              <a:t>frozen</a:t>
-            </a:r>
-            <a:r>
-              <a:rPr lang="fr-FR" dirty="0"/>
-              <a:t> </a:t>
-            </a:r>
-            <a:r>
-              <a:rPr lang="fr-FR" dirty="0" err="1"/>
-              <a:t>except</a:t>
-            </a:r>
-            <a:r>
-              <a:rPr lang="fr-FR" dirty="0"/>
-              <a:t> the </a:t>
-            </a:r>
-            <a:r>
-              <a:rPr lang="fr-FR" dirty="0" err="1"/>
-              <a:t>head</a:t>
-            </a:r>
-            <a:r>
-              <a:rPr lang="fr-FR" dirty="0"/>
-              <a:t>, and the </a:t>
-            </a:r>
-            <a:r>
-              <a:rPr lang="fr-FR" dirty="0" err="1"/>
-              <a:t>rest</a:t>
-            </a:r>
-            <a:r>
-              <a:rPr lang="fr-FR" dirty="0"/>
-              <a:t> </a:t>
-            </a:r>
-            <a:r>
-              <a:rPr lang="fr-FR" dirty="0" err="1"/>
-              <a:t>being</a:t>
-            </a:r>
-            <a:r>
-              <a:rPr lang="fr-FR" dirty="0"/>
-              <a:t> fine-tuning the </a:t>
-            </a:r>
-            <a:r>
-              <a:rPr lang="fr-FR" dirty="0" err="1"/>
-              <a:t>whole</a:t>
-            </a:r>
-            <a:r>
-              <a:rPr lang="fr-FR" dirty="0"/>
-              <a:t> model. </a:t>
-            </a:r>
-          </a:p>
-          <a:p>
-            <a:endParaRPr lang="en-US" dirty="0">
-              <a:solidFill>
-                <a:srgbClr val="FF6600"/>
-              </a:solidFill>
-            </a:endParaRPr>
-          </a:p>
-        </p:txBody>
-      </p:sp>
     </p:spTree>
     <p:extLst>
       <p:ext uri="{BB962C8B-B14F-4D97-AF65-F5344CB8AC3E}">
-        <p14:creationId xmlns:p14="http://schemas.microsoft.com/office/powerpoint/2010/main" val="2776838363"/>
+        <p14:creationId xmlns:p14="http://schemas.microsoft.com/office/powerpoint/2010/main" val="1876196029"/>
       </p:ext>
     </p:extLst>
   </p:cSld>
@@ -5265,8 +5317,13 @@
                   <a:srgbClr val="FF6600"/>
                 </a:solidFill>
               </a:rPr>
-              <a:t>Classification Training Stage</a:t>
-            </a:r>
+              <a:t>Cleaning Data</a:t>
+            </a:r>
+            <a:endParaRPr lang="en-US" b="1" dirty="0">
+              <a:solidFill>
+                <a:schemeClr val="bg1"/>
+              </a:solidFill>
+            </a:endParaRPr>
           </a:p>
         </p:txBody>
       </p:sp>
@@ -5330,7 +5387,7 @@
         </p:spPr>
         <p:txBody>
           <a:bodyPr>
-            <a:normAutofit/>
+            <a:normAutofit fontScale="40000" lnSpcReduction="20000"/>
           </a:bodyPr>
           <a:lstStyle/>
           <a:p>
@@ -5339,108 +5396,108 @@
               <a:buChar char="•"/>
             </a:pPr>
             <a:r>
-              <a:rPr lang="fr-FR" sz="2900" dirty="0" err="1"/>
-              <a:t>Gradual</a:t>
-            </a:r>
-            <a:r>
-              <a:rPr lang="fr-FR" sz="2900" dirty="0"/>
-              <a:t> </a:t>
-            </a:r>
-            <a:r>
-              <a:rPr lang="fr-FR" sz="2900" dirty="0" err="1"/>
-              <a:t>Unfreezing</a:t>
-            </a:r>
-            <a:r>
-              <a:rPr lang="fr-FR" sz="2900" dirty="0"/>
-              <a:t> technique: </a:t>
-            </a:r>
-            <a:r>
-              <a:rPr lang="fr-FR" sz="2900" dirty="0" err="1"/>
-              <a:t>slowly</a:t>
-            </a:r>
-            <a:r>
-              <a:rPr lang="fr-FR" sz="2900" dirty="0"/>
-              <a:t> </a:t>
-            </a:r>
-            <a:r>
-              <a:rPr lang="fr-FR" sz="2900" dirty="0" err="1"/>
-              <a:t>unfreeze</a:t>
-            </a:r>
-            <a:r>
-              <a:rPr lang="fr-FR" sz="2900" dirty="0"/>
-              <a:t> </a:t>
-            </a:r>
-            <a:r>
-              <a:rPr lang="fr-FR" sz="2900" dirty="0" err="1"/>
-              <a:t>from</a:t>
-            </a:r>
-            <a:r>
-              <a:rPr lang="fr-FR" sz="2900" dirty="0"/>
-              <a:t> the </a:t>
-            </a:r>
-            <a:r>
-              <a:rPr lang="fr-FR" sz="2900" dirty="0" err="1"/>
-              <a:t>head</a:t>
-            </a:r>
-            <a:r>
-              <a:rPr lang="fr-FR" sz="2900" dirty="0"/>
-              <a:t> </a:t>
-            </a:r>
-            <a:r>
-              <a:rPr lang="fr-FR" sz="2900" dirty="0" err="1"/>
-              <a:t>towards</a:t>
-            </a:r>
-            <a:r>
-              <a:rPr lang="fr-FR" sz="2900" dirty="0"/>
-              <a:t> the body, one layer by one layer, </a:t>
-            </a:r>
-            <a:r>
-              <a:rPr lang="fr-FR" sz="2900" dirty="0" err="1"/>
-              <a:t>each</a:t>
-            </a:r>
-            <a:r>
-              <a:rPr lang="fr-FR" sz="2900" dirty="0"/>
-              <a:t> training for </a:t>
-            </a:r>
-            <a:r>
-              <a:rPr lang="fr-FR" sz="2900" dirty="0" err="1"/>
-              <a:t>some</a:t>
-            </a:r>
-            <a:r>
-              <a:rPr lang="fr-FR" sz="2900" dirty="0"/>
-              <a:t> </a:t>
-            </a:r>
-            <a:r>
-              <a:rPr lang="fr-FR" sz="2900" dirty="0" err="1"/>
-              <a:t>epochs</a:t>
-            </a:r>
-            <a:r>
-              <a:rPr lang="fr-FR" sz="2900" dirty="0"/>
-              <a:t>. This </a:t>
-            </a:r>
-            <a:r>
-              <a:rPr lang="fr-FR" sz="2900" dirty="0" err="1"/>
-              <a:t>gives</a:t>
-            </a:r>
-            <a:r>
-              <a:rPr lang="fr-FR" sz="2900" dirty="0"/>
-              <a:t> </a:t>
-            </a:r>
-            <a:r>
-              <a:rPr lang="fr-FR" sz="2900" dirty="0" err="1"/>
-              <a:t>better</a:t>
-            </a:r>
-            <a:r>
-              <a:rPr lang="fr-FR" sz="2900" dirty="0"/>
-              <a:t> </a:t>
-            </a:r>
-            <a:r>
-              <a:rPr lang="fr-FR" sz="2900" dirty="0" err="1"/>
-              <a:t>result</a:t>
-            </a:r>
-            <a:r>
-              <a:rPr lang="fr-FR" sz="2900" dirty="0"/>
+              <a:rPr lang="fr-FR" sz="7200" dirty="0" err="1"/>
+              <a:t>Thresholding</a:t>
+            </a:r>
+            <a:r>
+              <a:rPr lang="fr-FR" sz="7200" dirty="0"/>
+              <a:t> line </a:t>
+            </a:r>
+            <a:r>
+              <a:rPr lang="fr-FR" sz="7200" dirty="0" err="1"/>
+              <a:t>number</a:t>
+            </a:r>
+            <a:r>
+              <a:rPr lang="fr-FR" sz="7200" dirty="0"/>
+              <a:t>: picking </a:t>
+            </a:r>
+            <a:r>
+              <a:rPr lang="fr-FR" sz="7200" dirty="0" err="1"/>
+              <a:t>only</a:t>
+            </a:r>
+            <a:r>
+              <a:rPr lang="fr-FR" sz="7200" dirty="0"/>
+              <a:t> </a:t>
+            </a:r>
+            <a:r>
+              <a:rPr lang="fr-FR" sz="7200" dirty="0" err="1"/>
+              <a:t>those</a:t>
+            </a:r>
+            <a:r>
+              <a:rPr lang="fr-FR" sz="7200" dirty="0"/>
+              <a:t> data </a:t>
+            </a:r>
+            <a:r>
+              <a:rPr lang="fr-FR" sz="7200" dirty="0" err="1"/>
+              <a:t>that</a:t>
+            </a:r>
+            <a:r>
+              <a:rPr lang="fr-FR" sz="7200" dirty="0"/>
+              <a:t> are </a:t>
+            </a:r>
+            <a:r>
+              <a:rPr lang="fr-FR" sz="7200" dirty="0" err="1"/>
+              <a:t>larger</a:t>
+            </a:r>
+            <a:r>
+              <a:rPr lang="fr-FR" sz="7200" dirty="0"/>
+              <a:t> </a:t>
+            </a:r>
+            <a:r>
+              <a:rPr lang="fr-FR" sz="7200" dirty="0" err="1"/>
+              <a:t>than</a:t>
+            </a:r>
+            <a:r>
+              <a:rPr lang="fr-FR" sz="7200" dirty="0"/>
+              <a:t> a certain line </a:t>
+            </a:r>
+            <a:r>
+              <a:rPr lang="fr-FR" sz="7200" dirty="0" err="1"/>
+              <a:t>number</a:t>
+            </a:r>
+            <a:r>
+              <a:rPr lang="fr-FR" sz="7200" dirty="0"/>
               <a:t>. </a:t>
+            </a:r>
+            <a:r>
+              <a:rPr lang="fr-FR" sz="7200" dirty="0" err="1"/>
+              <a:t>We</a:t>
+            </a:r>
+            <a:r>
+              <a:rPr lang="fr-FR" sz="7200" dirty="0"/>
+              <a:t> use 7 </a:t>
+            </a:r>
+            <a:r>
+              <a:rPr lang="fr-FR" sz="7200" dirty="0" err="1"/>
+              <a:t>lines</a:t>
+            </a:r>
+            <a:r>
+              <a:rPr lang="fr-FR" sz="7200" dirty="0"/>
+              <a:t> as </a:t>
+            </a:r>
+            <a:r>
+              <a:rPr lang="fr-FR" sz="7200" dirty="0" err="1"/>
+              <a:t>threshold</a:t>
+            </a:r>
+            <a:r>
+              <a:rPr lang="fr-FR" sz="7200" dirty="0"/>
+              <a:t> (</a:t>
+            </a:r>
+            <a:r>
+              <a:rPr lang="fr-FR" sz="7200" dirty="0" err="1"/>
+              <a:t>excluding</a:t>
+            </a:r>
+            <a:r>
+              <a:rPr lang="fr-FR" sz="7200" dirty="0"/>
+              <a:t> extra </a:t>
+            </a:r>
+            <a:r>
+              <a:rPr lang="fr-FR" sz="7200" dirty="0" err="1"/>
+              <a:t>newlines</a:t>
+            </a:r>
+            <a:r>
+              <a:rPr lang="fr-FR" sz="7200" dirty="0"/>
+              <a:t>).</a:t>
             </a:r>
           </a:p>
           <a:p>
@@ -5449,100 +5506,64 @@
               <a:buChar char="•"/>
             </a:pPr>
             <a:r>
-              <a:rPr lang="fr-FR" sz="2900" dirty="0" err="1"/>
-              <a:t>Gradual</a:t>
-            </a:r>
-            <a:r>
-              <a:rPr lang="fr-FR" sz="2900" dirty="0"/>
-              <a:t> </a:t>
-            </a:r>
-            <a:r>
-              <a:rPr lang="fr-FR" sz="2900" dirty="0" err="1"/>
-              <a:t>decrement</a:t>
-            </a:r>
-            <a:r>
-              <a:rPr lang="fr-FR" sz="2900" dirty="0"/>
-              <a:t> of </a:t>
-            </a:r>
-            <a:r>
-              <a:rPr lang="fr-FR" sz="2900" dirty="0" err="1"/>
-              <a:t>learning</a:t>
-            </a:r>
-            <a:r>
-              <a:rPr lang="fr-FR" sz="2900" dirty="0"/>
-              <a:t> rate: as </a:t>
-            </a:r>
-            <a:r>
-              <a:rPr lang="fr-FR" sz="2900" dirty="0" err="1"/>
-              <a:t>unfreezing</a:t>
-            </a:r>
-            <a:r>
-              <a:rPr lang="fr-FR" sz="2900" dirty="0"/>
-              <a:t> </a:t>
-            </a:r>
-            <a:r>
-              <a:rPr lang="fr-FR" sz="2900" dirty="0" err="1"/>
-              <a:t>goes</a:t>
-            </a:r>
-            <a:r>
-              <a:rPr lang="fr-FR" sz="2900" dirty="0"/>
-              <a:t>, </a:t>
-            </a:r>
-            <a:r>
-              <a:rPr lang="fr-FR" sz="2900" dirty="0" err="1"/>
-              <a:t>learning</a:t>
-            </a:r>
-            <a:r>
-              <a:rPr lang="fr-FR" sz="2900" dirty="0"/>
-              <a:t> rate </a:t>
-            </a:r>
-            <a:r>
-              <a:rPr lang="fr-FR" sz="2900" dirty="0" err="1"/>
-              <a:t>decrease</a:t>
-            </a:r>
-            <a:r>
-              <a:rPr lang="fr-FR" sz="2900" dirty="0"/>
-              <a:t> to not </a:t>
-            </a:r>
-            <a:r>
-              <a:rPr lang="fr-FR" sz="2900" dirty="0" err="1"/>
-              <a:t>perturb</a:t>
-            </a:r>
-            <a:r>
-              <a:rPr lang="fr-FR" sz="2900" dirty="0"/>
-              <a:t> the </a:t>
-            </a:r>
-            <a:r>
-              <a:rPr lang="fr-FR" sz="2900" dirty="0" err="1"/>
-              <a:t>pretrained</a:t>
-            </a:r>
-            <a:r>
-              <a:rPr lang="fr-FR" sz="2900" dirty="0"/>
-              <a:t> model </a:t>
-            </a:r>
-            <a:r>
-              <a:rPr lang="fr-FR" sz="2900" dirty="0" err="1"/>
-              <a:t>weights</a:t>
-            </a:r>
-            <a:r>
-              <a:rPr lang="fr-FR" sz="2900" dirty="0"/>
-              <a:t> by </a:t>
-            </a:r>
-            <a:r>
-              <a:rPr lang="fr-FR" sz="2900" dirty="0" err="1"/>
-              <a:t>too</a:t>
-            </a:r>
-            <a:r>
-              <a:rPr lang="fr-FR" sz="2900" dirty="0"/>
-              <a:t> </a:t>
-            </a:r>
-            <a:r>
-              <a:rPr lang="fr-FR" sz="2900" dirty="0" err="1"/>
-              <a:t>much</a:t>
-            </a:r>
-            <a:r>
-              <a:rPr lang="fr-FR" sz="2900" dirty="0"/>
-              <a:t>. </a:t>
+              <a:rPr lang="fr-FR" sz="7200" dirty="0"/>
+              <a:t>OOV article </a:t>
+            </a:r>
+            <a:r>
+              <a:rPr lang="fr-FR" sz="7200" dirty="0" err="1"/>
+              <a:t>removal</a:t>
+            </a:r>
+            <a:r>
+              <a:rPr lang="fr-FR" sz="7200" dirty="0"/>
+              <a:t>: </a:t>
+            </a:r>
+            <a:r>
+              <a:rPr lang="fr-FR" sz="7200" dirty="0" err="1"/>
+              <a:t>remove</a:t>
+            </a:r>
+            <a:r>
+              <a:rPr lang="fr-FR" sz="7200" dirty="0"/>
+              <a:t> all articles </a:t>
+            </a:r>
+            <a:r>
+              <a:rPr lang="fr-FR" sz="7200" dirty="0" err="1"/>
+              <a:t>with</a:t>
+            </a:r>
+            <a:r>
+              <a:rPr lang="fr-FR" sz="7200" dirty="0"/>
+              <a:t> OOV </a:t>
+            </a:r>
+            <a:r>
+              <a:rPr lang="fr-FR" sz="7200" dirty="0" err="1"/>
+              <a:t>occupying</a:t>
+            </a:r>
+            <a:r>
+              <a:rPr lang="fr-FR" sz="7200" dirty="0"/>
+              <a:t> more </a:t>
+            </a:r>
+            <a:r>
+              <a:rPr lang="fr-FR" sz="7200" dirty="0" err="1"/>
+              <a:t>than</a:t>
+            </a:r>
+            <a:r>
+              <a:rPr lang="fr-FR" sz="7200" dirty="0"/>
+              <a:t> </a:t>
+            </a:r>
+            <a:r>
+              <a:rPr lang="fr-FR" sz="7200" dirty="0" err="1"/>
+              <a:t>threshold</a:t>
+            </a:r>
+            <a:r>
+              <a:rPr lang="fr-FR" sz="7200" dirty="0"/>
+              <a:t> percentage of data. </a:t>
+            </a:r>
+            <a:r>
+              <a:rPr lang="fr-FR" sz="7200" dirty="0" err="1"/>
+              <a:t>We</a:t>
+            </a:r>
+            <a:r>
+              <a:rPr lang="fr-FR" sz="7200" dirty="0"/>
+              <a:t> use 10%. </a:t>
             </a:r>
           </a:p>
           <a:p>
@@ -5551,36 +5572,16 @@
               <a:buChar char="•"/>
             </a:pPr>
             <a:r>
-              <a:rPr lang="fr-FR" sz="2900" dirty="0" err="1"/>
-              <a:t>Results</a:t>
-            </a:r>
-            <a:r>
-              <a:rPr lang="fr-FR" sz="2900" dirty="0"/>
-              <a:t> </a:t>
-            </a:r>
-            <a:r>
-              <a:rPr lang="fr-FR" sz="2900" dirty="0" err="1"/>
-              <a:t>around</a:t>
-            </a:r>
-            <a:r>
-              <a:rPr lang="fr-FR" sz="2900" dirty="0"/>
-              <a:t> 0.82-0.83 for </a:t>
-            </a:r>
-            <a:r>
-              <a:rPr lang="fr-FR" sz="2900" dirty="0" err="1"/>
-              <a:t>several</a:t>
-            </a:r>
-            <a:r>
-              <a:rPr lang="fr-FR" sz="2900" dirty="0"/>
-              <a:t> </a:t>
-            </a:r>
-            <a:r>
-              <a:rPr lang="fr-FR" sz="2900" dirty="0" err="1"/>
-              <a:t>epochs</a:t>
-            </a:r>
-            <a:r>
-              <a:rPr lang="fr-FR" sz="2900" dirty="0"/>
-              <a:t> of training. </a:t>
+              <a:rPr lang="fr-FR" sz="7200" dirty="0"/>
+              <a:t>Regex </a:t>
+            </a:r>
+            <a:r>
+              <a:rPr lang="fr-FR" sz="7200" dirty="0" err="1"/>
+              <a:t>cleaning</a:t>
+            </a:r>
+            <a:r>
+              <a:rPr lang="fr-FR" sz="7200" dirty="0"/>
+              <a:t> of data. </a:t>
             </a:r>
           </a:p>
           <a:p>
@@ -5589,40 +5590,92 @@
               <a:buChar char="•"/>
             </a:pPr>
             <a:r>
-              <a:rPr lang="fr-FR" sz="2900" dirty="0"/>
-              <a:t>Best benchmarking </a:t>
-            </a:r>
-            <a:r>
-              <a:rPr lang="fr-FR" sz="2900" dirty="0" err="1"/>
-              <a:t>result</a:t>
-            </a:r>
-            <a:r>
-              <a:rPr lang="fr-FR" sz="2900" dirty="0"/>
-              <a:t> are at 0.886. [2] Our </a:t>
-            </a:r>
-            <a:r>
-              <a:rPr lang="fr-FR" sz="2900" dirty="0" err="1"/>
-              <a:t>result</a:t>
-            </a:r>
-            <a:r>
-              <a:rPr lang="fr-FR" sz="2900" dirty="0"/>
-              <a:t> </a:t>
-            </a:r>
-            <a:r>
-              <a:rPr lang="fr-FR" sz="2900" dirty="0" err="1"/>
-              <a:t>would</a:t>
-            </a:r>
-            <a:r>
-              <a:rPr lang="fr-FR" sz="2900" dirty="0"/>
-              <a:t> let us </a:t>
-            </a:r>
-            <a:r>
-              <a:rPr lang="fr-FR" sz="2900" dirty="0" err="1"/>
-              <a:t>be</a:t>
-            </a:r>
-            <a:r>
-              <a:rPr lang="fr-FR" sz="2900" dirty="0"/>
-              <a:t> in the top 11. </a:t>
+              <a:rPr lang="fr-FR" sz="7200" dirty="0" err="1"/>
+              <a:t>Spelling</a:t>
+            </a:r>
+            <a:r>
+              <a:rPr lang="fr-FR" sz="7200" dirty="0"/>
+              <a:t> </a:t>
+            </a:r>
+            <a:r>
+              <a:rPr lang="fr-FR" sz="7200" dirty="0" err="1"/>
+              <a:t>mistakes</a:t>
+            </a:r>
+            <a:r>
+              <a:rPr lang="fr-FR" sz="7200" dirty="0"/>
+              <a:t> </a:t>
+            </a:r>
+            <a:r>
+              <a:rPr lang="fr-FR" sz="7200" dirty="0" err="1"/>
+              <a:t>cleaning</a:t>
+            </a:r>
+            <a:r>
+              <a:rPr lang="fr-FR" sz="7200" dirty="0"/>
+              <a:t>: clean </a:t>
+            </a:r>
+            <a:r>
+              <a:rPr lang="fr-FR" sz="7200" dirty="0" err="1"/>
+              <a:t>those</a:t>
+            </a:r>
+            <a:r>
+              <a:rPr lang="fr-FR" sz="7200" dirty="0"/>
+              <a:t> </a:t>
+            </a:r>
+            <a:r>
+              <a:rPr lang="fr-FR" sz="7200" dirty="0" err="1"/>
+              <a:t>we</a:t>
+            </a:r>
+            <a:r>
+              <a:rPr lang="fr-FR" sz="7200" dirty="0"/>
+              <a:t> </a:t>
+            </a:r>
+            <a:r>
+              <a:rPr lang="fr-FR" sz="7200" dirty="0" err="1"/>
+              <a:t>saw</a:t>
+            </a:r>
+            <a:r>
+              <a:rPr lang="fr-FR" sz="7200" dirty="0"/>
+              <a:t> </a:t>
+            </a:r>
+            <a:r>
+              <a:rPr lang="fr-FR" sz="7200" dirty="0" err="1"/>
+              <a:t>mistakes</a:t>
+            </a:r>
+            <a:r>
+              <a:rPr lang="fr-FR" sz="7200" dirty="0"/>
+              <a:t> in. </a:t>
+            </a:r>
+            <a:r>
+              <a:rPr lang="fr-FR" sz="7200" dirty="0" err="1"/>
+              <a:t>Unfortunately</a:t>
+            </a:r>
+            <a:r>
+              <a:rPr lang="fr-FR" sz="7200" dirty="0"/>
+              <a:t> </a:t>
+            </a:r>
+            <a:r>
+              <a:rPr lang="fr-FR" sz="7200" dirty="0" err="1"/>
+              <a:t>they’re</a:t>
+            </a:r>
+            <a:r>
+              <a:rPr lang="fr-FR" sz="7200" dirty="0"/>
+              <a:t> not </a:t>
+            </a:r>
+            <a:r>
+              <a:rPr lang="fr-FR" sz="7200" dirty="0" err="1"/>
+              <a:t>necessarily</a:t>
+            </a:r>
+            <a:r>
+              <a:rPr lang="fr-FR" sz="7200" dirty="0"/>
+              <a:t> all the </a:t>
+            </a:r>
+            <a:r>
+              <a:rPr lang="fr-FR" sz="7200" dirty="0" err="1"/>
+              <a:t>mistakes</a:t>
+            </a:r>
+            <a:r>
+              <a:rPr lang="fr-FR" sz="7200" dirty="0"/>
+              <a:t> made in the files.</a:t>
             </a:r>
           </a:p>
           <a:p>
@@ -5630,7 +5683,133 @@
               <a:buFont typeface="Arial" panose="020B0604020202020204" pitchFamily="34" charset="0"/>
               <a:buChar char="•"/>
             </a:pPr>
-            <a:endParaRPr lang="en-US" sz="2900" dirty="0">
+            <a:r>
+              <a:rPr lang="fr-FR" sz="7200" dirty="0"/>
+              <a:t>British to American </a:t>
+            </a:r>
+            <a:r>
+              <a:rPr lang="fr-FR" sz="7200" dirty="0" err="1"/>
+              <a:t>english</a:t>
+            </a:r>
+            <a:r>
+              <a:rPr lang="fr-FR" sz="7200" dirty="0"/>
+              <a:t>: « </a:t>
+            </a:r>
+            <a:r>
+              <a:rPr lang="fr-FR" sz="7200" dirty="0" err="1"/>
+              <a:t>color</a:t>
+            </a:r>
+            <a:r>
+              <a:rPr lang="fr-FR" sz="7200" dirty="0"/>
+              <a:t> » and « </a:t>
+            </a:r>
+            <a:r>
+              <a:rPr lang="fr-FR" sz="7200" dirty="0" err="1"/>
+              <a:t>colour</a:t>
+            </a:r>
+            <a:r>
+              <a:rPr lang="fr-FR" sz="7200" dirty="0"/>
+              <a:t> » </a:t>
+            </a:r>
+            <a:r>
+              <a:rPr lang="fr-FR" sz="7200" dirty="0" err="1"/>
+              <a:t>should</a:t>
+            </a:r>
+            <a:r>
+              <a:rPr lang="fr-FR" sz="7200" dirty="0"/>
+              <a:t> have the </a:t>
+            </a:r>
+            <a:r>
+              <a:rPr lang="fr-FR" sz="7200" dirty="0" err="1"/>
+              <a:t>same</a:t>
+            </a:r>
+            <a:r>
+              <a:rPr lang="fr-FR" sz="7200" dirty="0"/>
+              <a:t> </a:t>
+            </a:r>
+            <a:r>
+              <a:rPr lang="fr-FR" sz="7200" dirty="0" err="1"/>
+              <a:t>meaning</a:t>
+            </a:r>
+            <a:r>
+              <a:rPr lang="fr-FR" sz="7200" dirty="0"/>
+              <a:t> </a:t>
+            </a:r>
+            <a:r>
+              <a:rPr lang="fr-FR" sz="7200" dirty="0" err="1"/>
+              <a:t>with</a:t>
+            </a:r>
+            <a:r>
+              <a:rPr lang="fr-FR" sz="7200" dirty="0"/>
+              <a:t> </a:t>
+            </a:r>
+            <a:r>
+              <a:rPr lang="fr-FR" sz="7200" dirty="0" err="1"/>
+              <a:t>same</a:t>
+            </a:r>
+            <a:r>
+              <a:rPr lang="fr-FR" sz="7200" dirty="0"/>
+              <a:t> </a:t>
+            </a:r>
+            <a:r>
+              <a:rPr lang="fr-FR" sz="7200" dirty="0" err="1"/>
+              <a:t>embeddings</a:t>
+            </a:r>
+            <a:r>
+              <a:rPr lang="fr-FR" sz="7200" dirty="0"/>
+              <a:t>, </a:t>
+            </a:r>
+            <a:r>
+              <a:rPr lang="fr-FR" sz="7200" dirty="0" err="1"/>
+              <a:t>so</a:t>
+            </a:r>
+            <a:r>
+              <a:rPr lang="fr-FR" sz="7200" dirty="0"/>
+              <a:t> </a:t>
+            </a:r>
+            <a:r>
+              <a:rPr lang="fr-FR" sz="7200" dirty="0" err="1"/>
+              <a:t>convert</a:t>
+            </a:r>
+            <a:r>
+              <a:rPr lang="fr-FR" sz="7200" dirty="0"/>
+              <a:t> </a:t>
+            </a:r>
+            <a:r>
+              <a:rPr lang="fr-FR" sz="7200" dirty="0" err="1"/>
+              <a:t>everything</a:t>
+            </a:r>
+            <a:r>
+              <a:rPr lang="fr-FR" sz="7200" dirty="0"/>
+              <a:t> </a:t>
+            </a:r>
+            <a:r>
+              <a:rPr lang="fr-FR" sz="7200" dirty="0" err="1"/>
+              <a:t>that</a:t>
+            </a:r>
+            <a:r>
+              <a:rPr lang="fr-FR" sz="7200" dirty="0"/>
+              <a:t> </a:t>
+            </a:r>
+            <a:r>
+              <a:rPr lang="fr-FR" sz="7200" dirty="0" err="1"/>
+              <a:t>conflicts</a:t>
+            </a:r>
+            <a:r>
+              <a:rPr lang="fr-FR" sz="7200" dirty="0"/>
+              <a:t> to one of </a:t>
+            </a:r>
+            <a:r>
+              <a:rPr lang="fr-FR" sz="7200" dirty="0" err="1"/>
+              <a:t>it</a:t>
+            </a:r>
+            <a:r>
+              <a:rPr lang="fr-FR" sz="7200" dirty="0"/>
+              <a:t>. </a:t>
+            </a:r>
+          </a:p>
+          <a:p>
+            <a:endParaRPr lang="en-US" sz="6600" dirty="0">
               <a:solidFill>
                 <a:srgbClr val="FF6600"/>
               </a:solidFill>
@@ -5641,7 +5820,7 @@
     </p:spTree>
     <p:extLst>
       <p:ext uri="{BB962C8B-B14F-4D97-AF65-F5344CB8AC3E}">
-        <p14:creationId xmlns:p14="http://schemas.microsoft.com/office/powerpoint/2010/main" val="44715776"/>
+        <p14:creationId xmlns:p14="http://schemas.microsoft.com/office/powerpoint/2010/main" val="116821060"/>
       </p:ext>
     </p:extLst>
   </p:cSld>
@@ -5703,7 +5882,7 @@
                   <a:srgbClr val="FF6600"/>
                 </a:solidFill>
               </a:rPr>
-              <a:t>References</a:t>
+              <a:t>Model: AWD-LSTM[1]</a:t>
             </a:r>
           </a:p>
         </p:txBody>
@@ -5772,39 +5951,501 @@
           </a:bodyPr>
           <a:lstStyle/>
           <a:p>
-            <a:pPr marL="0" indent="0" algn="l">
-              <a:buNone/>
+            <a:pPr marL="857250" indent="-857250" algn="l">
+              <a:buFont typeface="Arial" panose="020B0604020202020204" pitchFamily="34" charset="0"/>
+              <a:buChar char="•"/>
             </a:pPr>
             <a:r>
               <a:rPr lang="fr-FR" sz="2900" dirty="0"/>
-              <a:t>[1] </a:t>
-            </a:r>
-            <a:r>
-              <a:rPr lang="fr-FR" sz="2900" dirty="0">
-                <a:hlinkClick r:id="rId3"/>
+              <a:t>Uses </a:t>
+            </a:r>
+            <a:r>
+              <a:rPr lang="fr-FR" sz="2900" dirty="0" err="1"/>
+              <a:t>DropConnect</a:t>
+            </a:r>
+            <a:r>
+              <a:rPr lang="fr-FR" sz="2900" dirty="0"/>
+              <a:t> and a variant of </a:t>
+            </a:r>
+            <a:r>
+              <a:rPr lang="fr-FR" sz="2900" dirty="0" err="1"/>
+              <a:t>Average</a:t>
+            </a:r>
+            <a:r>
+              <a:rPr lang="fr-FR" sz="2900" dirty="0"/>
+              <a:t>-SGD (NT-ASGD) </a:t>
+            </a:r>
+            <a:r>
+              <a:rPr lang="fr-FR" sz="2900" dirty="0" err="1"/>
+              <a:t>along</a:t>
+            </a:r>
+            <a:r>
+              <a:rPr lang="fr-FR" sz="2900" dirty="0"/>
+              <a:t> </a:t>
+            </a:r>
+            <a:r>
+              <a:rPr lang="fr-FR" sz="2900" dirty="0" err="1"/>
+              <a:t>with</a:t>
+            </a:r>
+            <a:r>
+              <a:rPr lang="fr-FR" sz="2900" dirty="0"/>
+              <a:t> </a:t>
+            </a:r>
+            <a:r>
+              <a:rPr lang="fr-FR" sz="2900" dirty="0" err="1"/>
+              <a:t>several</a:t>
+            </a:r>
+            <a:r>
+              <a:rPr lang="fr-FR" sz="2900" dirty="0"/>
+              <a:t> </a:t>
+            </a:r>
+            <a:r>
+              <a:rPr lang="fr-FR" sz="2900" dirty="0" err="1"/>
+              <a:t>other</a:t>
+            </a:r>
+            <a:r>
+              <a:rPr lang="fr-FR" sz="2900" dirty="0"/>
+              <a:t> </a:t>
+            </a:r>
+            <a:r>
+              <a:rPr lang="fr-FR" sz="2900" dirty="0" err="1"/>
+              <a:t>regularization</a:t>
+            </a:r>
+            <a:r>
+              <a:rPr lang="fr-FR" sz="2900" dirty="0"/>
+              <a:t> techniques. </a:t>
+            </a:r>
+          </a:p>
+          <a:p>
+            <a:pPr marL="857250" indent="-857250" algn="l">
+              <a:buFont typeface="Arial" panose="020B0604020202020204" pitchFamily="34" charset="0"/>
+              <a:buChar char="•"/>
+            </a:pPr>
+            <a:r>
+              <a:rPr lang="fr-FR" sz="2900" dirty="0"/>
+              <a:t>Default of </a:t>
+            </a:r>
+            <a:r>
+              <a:rPr lang="fr-FR" sz="2900" dirty="0" err="1"/>
+              <a:t>fastai’s</a:t>
+            </a:r>
+            <a:r>
+              <a:rPr lang="fr-FR" sz="2900" dirty="0"/>
+              <a:t> NLP model and </a:t>
+            </a:r>
+            <a:r>
+              <a:rPr lang="fr-FR" sz="2900" dirty="0" err="1"/>
+              <a:t>was</a:t>
+            </a:r>
+            <a:r>
+              <a:rPr lang="fr-FR" sz="2900" dirty="0"/>
+              <a:t> state of the art </a:t>
+            </a:r>
+            <a:r>
+              <a:rPr lang="fr-FR" sz="2900" dirty="0" err="1"/>
+              <a:t>three</a:t>
+            </a:r>
+            <a:r>
+              <a:rPr lang="fr-FR" sz="2900" dirty="0"/>
+              <a:t> </a:t>
+            </a:r>
+            <a:r>
+              <a:rPr lang="fr-FR" sz="2900" dirty="0" err="1"/>
+              <a:t>years</a:t>
+            </a:r>
+            <a:r>
+              <a:rPr lang="fr-FR" sz="2900" dirty="0"/>
+              <a:t> </a:t>
+            </a:r>
+            <a:r>
+              <a:rPr lang="fr-FR" sz="2900" dirty="0" err="1"/>
+              <a:t>ago</a:t>
+            </a:r>
+            <a:r>
+              <a:rPr lang="fr-FR" sz="2900" dirty="0"/>
+              <a:t>, </a:t>
+            </a:r>
+            <a:r>
+              <a:rPr lang="fr-FR" sz="2900" dirty="0" err="1"/>
+              <a:t>giving</a:t>
+            </a:r>
+            <a:r>
+              <a:rPr lang="fr-FR" sz="2900" dirty="0"/>
+              <a:t> acceptable </a:t>
+            </a:r>
+            <a:r>
+              <a:rPr lang="fr-FR" sz="2900" dirty="0" err="1"/>
+              <a:t>results</a:t>
+            </a:r>
+            <a:r>
+              <a:rPr lang="fr-FR" sz="2900" dirty="0"/>
+              <a:t>. </a:t>
+            </a:r>
+          </a:p>
+          <a:p>
+            <a:endParaRPr lang="en-US" sz="6600" dirty="0">
+              <a:solidFill>
+                <a:srgbClr val="FF6600"/>
+              </a:solidFill>
+            </a:endParaRPr>
+          </a:p>
+        </p:txBody>
+      </p:sp>
+    </p:spTree>
+    <p:extLst>
+      <p:ext uri="{BB962C8B-B14F-4D97-AF65-F5344CB8AC3E}">
+        <p14:creationId xmlns:p14="http://schemas.microsoft.com/office/powerpoint/2010/main" val="2136202155"/>
+      </p:ext>
+    </p:extLst>
+  </p:cSld>
+  <p:clrMapOvr>
+    <a:masterClrMapping/>
+  </p:clrMapOvr>
+</p:sld>
+</file>
+
+<file path=ppt/slides/slide9.xml><?xml version="1.0" encoding="utf-8"?>
+<p:sld xmlns:a="http://schemas.openxmlformats.org/drawingml/2006/main" xmlns:r="http://schemas.openxmlformats.org/officeDocument/2006/relationships" xmlns:p="http://schemas.openxmlformats.org/presentationml/2006/main">
+  <p:cSld>
+    <p:spTree>
+      <p:nvGrpSpPr>
+        <p:cNvPr id="1" name=""/>
+        <p:cNvGrpSpPr/>
+        <p:nvPr/>
+      </p:nvGrpSpPr>
+      <p:grpSpPr>
+        <a:xfrm>
+          <a:off x="0" y="0"/>
+          <a:ext cx="0" cy="0"/>
+          <a:chOff x="0" y="0"/>
+          <a:chExt cx="0" cy="0"/>
+        </a:xfrm>
+      </p:grpSpPr>
+      <p:sp>
+        <p:nvSpPr>
+          <p:cNvPr id="2" name="Title 1">
+            <a:extLst>
+              <a:ext uri="{FF2B5EF4-FFF2-40B4-BE49-F238E27FC236}">
+                <a16:creationId xmlns:a16="http://schemas.microsoft.com/office/drawing/2014/main" id="{E8B8F26E-9345-4747-9094-972E38700A17}"/>
+              </a:ext>
+            </a:extLst>
+          </p:cNvPr>
+          <p:cNvSpPr>
+            <a:spLocks noGrp="1"/>
+          </p:cNvSpPr>
+          <p:nvPr>
+            <p:ph type="ctrTitle"/>
+          </p:nvPr>
+        </p:nvSpPr>
+        <p:spPr>
+          <a:xfrm rot="5400000">
+            <a:off x="-562431" y="562430"/>
+            <a:ext cx="6858002" cy="5733142"/>
+          </a:xfrm>
+          <a:solidFill>
+            <a:srgbClr val="3B3B3B"/>
+          </a:solidFill>
+        </p:spPr>
+        <p:txBody>
+          <a:bodyPr vert="vert270" anchor="t" anchorCtr="0"/>
+          <a:lstStyle/>
+          <a:p>
+            <a:r>
+              <a:rPr lang="en-US" b="1" dirty="0">
+                <a:solidFill>
+                  <a:srgbClr val="FF6600"/>
+                </a:solidFill>
               </a:rPr>
-              <a:t>https://yashuseth.blog/2018/09/12/awd-lstm-explanation-understanding-language-model/</a:t>
-            </a:r>
-            <a:endParaRPr lang="fr-FR" sz="2900" dirty="0"/>
-          </a:p>
-          <a:p>
-            <a:pPr marL="0" indent="0" algn="l">
-              <a:buNone/>
+              <a:t>Training Method: </a:t>
+            </a:r>
+            <a:r>
+              <a:rPr lang="en-US" b="1" dirty="0" err="1">
+                <a:solidFill>
+                  <a:srgbClr val="FF6600"/>
+                </a:solidFill>
+              </a:rPr>
+              <a:t>ULMFiT</a:t>
+            </a:r>
+            <a:endParaRPr lang="en-US" b="1" dirty="0">
+              <a:solidFill>
+                <a:srgbClr val="FF6600"/>
+              </a:solidFill>
+            </a:endParaRPr>
+          </a:p>
+        </p:txBody>
+      </p:sp>
+      <p:pic>
+        <p:nvPicPr>
+          <p:cNvPr id="4" name="Picture 3">
+            <a:extLst>
+              <a:ext uri="{FF2B5EF4-FFF2-40B4-BE49-F238E27FC236}">
+                <a16:creationId xmlns:a16="http://schemas.microsoft.com/office/drawing/2014/main" id="{7A465064-0714-5743-882B-8875105A7023}"/>
+              </a:ext>
+            </a:extLst>
+          </p:cNvPr>
+          <p:cNvPicPr>
+            <a:picLocks noChangeAspect="1"/>
+          </p:cNvPicPr>
+          <p:nvPr/>
+        </p:nvPicPr>
+        <p:blipFill>
+          <a:blip r:embed="rId2" cstate="print">
+            <a:extLst>
+              <a:ext uri="{28A0092B-C50C-407E-A947-70E740481C1C}">
+                <a14:useLocalDpi xmlns:a14="http://schemas.microsoft.com/office/drawing/2010/main" val="0"/>
+              </a:ext>
+            </a:extLst>
+          </a:blip>
+          <a:stretch>
+            <a:fillRect/>
+          </a:stretch>
+        </p:blipFill>
+        <p:spPr>
+          <a:xfrm>
+            <a:off x="0" y="5863771"/>
+            <a:ext cx="1654627" cy="994232"/>
+          </a:xfrm>
+          <a:prstGeom prst="rect">
+            <a:avLst/>
+          </a:prstGeom>
+        </p:spPr>
+      </p:pic>
+      <p:sp>
+        <p:nvSpPr>
+          <p:cNvPr id="6" name="Subtitle 5">
+            <a:extLst>
+              <a:ext uri="{FF2B5EF4-FFF2-40B4-BE49-F238E27FC236}">
+                <a16:creationId xmlns:a16="http://schemas.microsoft.com/office/drawing/2014/main" id="{2D4BA697-580E-5544-8F2F-194AD99B859F}"/>
+              </a:ext>
+            </a:extLst>
+          </p:cNvPr>
+          <p:cNvSpPr>
+            <a:spLocks noGrp="1"/>
+          </p:cNvSpPr>
+          <p:nvPr>
+            <p:ph type="subTitle" idx="1"/>
+          </p:nvPr>
+        </p:nvSpPr>
+        <p:spPr>
+          <a:xfrm>
+            <a:off x="5733141" y="0"/>
+            <a:ext cx="6458859" cy="6858000"/>
+          </a:xfrm>
+        </p:spPr>
+        <p:txBody>
+          <a:bodyPr>
+            <a:normAutofit/>
+          </a:bodyPr>
+          <a:lstStyle/>
+          <a:p>
+            <a:pPr marL="457200" indent="-457200" algn="l">
+              <a:buFont typeface="Arial" panose="020B0604020202020204" pitchFamily="34" charset="0"/>
+              <a:buChar char="•"/>
             </a:pPr>
             <a:r>
-              <a:rPr lang="fr-FR" sz="2900" dirty="0"/>
-              <a:t>[2] </a:t>
-            </a:r>
-            <a:r>
-              <a:rPr lang="fr-FR" sz="2900" dirty="0">
-                <a:hlinkClick r:id="rId4"/>
-              </a:rPr>
-              <a:t>https://paperswithcode.com/sota/text-classification-on-20news</a:t>
-            </a:r>
-            <a:endParaRPr lang="fr-FR" sz="2900" dirty="0"/>
-          </a:p>
-          <a:p>
-            <a:pPr algn="l"/>
+              <a:rPr lang="fr-FR" sz="2900" dirty="0" err="1"/>
+              <a:t>Three</a:t>
+            </a:r>
+            <a:r>
+              <a:rPr lang="fr-FR" sz="2900" dirty="0"/>
+              <a:t> </a:t>
+            </a:r>
+            <a:r>
+              <a:rPr lang="fr-FR" sz="2900" dirty="0" err="1"/>
+              <a:t>steps</a:t>
+            </a:r>
+            <a:r>
+              <a:rPr lang="fr-FR" sz="2900" dirty="0"/>
+              <a:t> for </a:t>
+            </a:r>
+            <a:r>
+              <a:rPr lang="fr-FR" sz="2900" dirty="0" err="1"/>
+              <a:t>ULMFiT</a:t>
+            </a:r>
+            <a:r>
+              <a:rPr lang="fr-FR" sz="2900" dirty="0"/>
+              <a:t> are: </a:t>
+            </a:r>
+          </a:p>
+          <a:p>
+            <a:pPr marL="457200" indent="-457200" algn="l">
+              <a:buFont typeface="Arial" panose="020B0604020202020204" pitchFamily="34" charset="0"/>
+              <a:buChar char="•"/>
+            </a:pPr>
+            <a:r>
+              <a:rPr lang="fr-FR" sz="2900" dirty="0"/>
+              <a:t>AWD-LSTM </a:t>
+            </a:r>
+            <a:r>
+              <a:rPr lang="fr-FR" sz="2900" dirty="0" err="1"/>
+              <a:t>pretrained</a:t>
+            </a:r>
+            <a:r>
+              <a:rPr lang="fr-FR" sz="2900" dirty="0"/>
+              <a:t> on WikiText-103 corpus (made </a:t>
+            </a:r>
+            <a:r>
+              <a:rPr lang="fr-FR" sz="2900" dirty="0" err="1"/>
+              <a:t>available</a:t>
+            </a:r>
+            <a:r>
+              <a:rPr lang="fr-FR" sz="2900" dirty="0"/>
+              <a:t> </a:t>
+            </a:r>
+            <a:r>
+              <a:rPr lang="fr-FR" sz="2900" dirty="0" err="1"/>
+              <a:t>already</a:t>
+            </a:r>
+            <a:r>
+              <a:rPr lang="fr-FR" sz="2900" dirty="0"/>
+              <a:t>). </a:t>
+            </a:r>
+          </a:p>
+          <a:p>
+            <a:pPr marL="457200" indent="-457200" algn="l">
+              <a:buFont typeface="Arial" panose="020B0604020202020204" pitchFamily="34" charset="0"/>
+              <a:buChar char="•"/>
+            </a:pPr>
+            <a:r>
+              <a:rPr lang="fr-FR" sz="2900" dirty="0"/>
+              <a:t>(</a:t>
+            </a:r>
+            <a:r>
+              <a:rPr lang="fr-FR" sz="2900" b="1" dirty="0" err="1"/>
+              <a:t>Pretraining</a:t>
+            </a:r>
+            <a:r>
+              <a:rPr lang="fr-FR" sz="2900" b="1" dirty="0"/>
+              <a:t> stage</a:t>
+            </a:r>
+            <a:r>
+              <a:rPr lang="fr-FR" sz="2900" dirty="0"/>
+              <a:t>) Transfer </a:t>
+            </a:r>
+            <a:r>
+              <a:rPr lang="fr-FR" sz="2900" dirty="0" err="1"/>
+              <a:t>learning</a:t>
+            </a:r>
+            <a:r>
+              <a:rPr lang="fr-FR" sz="2900" dirty="0"/>
+              <a:t> to </a:t>
+            </a:r>
+            <a:r>
+              <a:rPr lang="fr-FR" sz="2900" dirty="0" err="1"/>
+              <a:t>your</a:t>
+            </a:r>
+            <a:r>
+              <a:rPr lang="fr-FR" sz="2900" dirty="0"/>
+              <a:t> corpus of </a:t>
+            </a:r>
+            <a:r>
+              <a:rPr lang="fr-FR" sz="2900" dirty="0" err="1"/>
+              <a:t>words</a:t>
+            </a:r>
+            <a:r>
+              <a:rPr lang="fr-FR" sz="2900" dirty="0"/>
+              <a:t> (corpus </a:t>
+            </a:r>
+            <a:r>
+              <a:rPr lang="fr-FR" sz="2900" dirty="0" err="1"/>
+              <a:t>predict</a:t>
+            </a:r>
+            <a:r>
+              <a:rPr lang="fr-FR" sz="2900" dirty="0"/>
+              <a:t> </a:t>
+            </a:r>
+            <a:r>
+              <a:rPr lang="fr-FR" sz="2900" dirty="0" err="1"/>
+              <a:t>what</a:t>
+            </a:r>
+            <a:r>
+              <a:rPr lang="fr-FR" sz="2900" dirty="0"/>
+              <a:t> the </a:t>
+            </a:r>
+            <a:r>
+              <a:rPr lang="fr-FR" sz="2900" dirty="0" err="1"/>
+              <a:t>next</a:t>
+            </a:r>
+            <a:r>
+              <a:rPr lang="fr-FR" sz="2900" dirty="0"/>
+              <a:t> </a:t>
+            </a:r>
+            <a:r>
+              <a:rPr lang="fr-FR" sz="2900" dirty="0" err="1"/>
+              <a:t>word</a:t>
+            </a:r>
+            <a:r>
+              <a:rPr lang="fr-FR" sz="2900" dirty="0"/>
+              <a:t> </a:t>
+            </a:r>
+            <a:r>
+              <a:rPr lang="fr-FR" sz="2900" dirty="0" err="1"/>
+              <a:t>is</a:t>
+            </a:r>
+            <a:r>
+              <a:rPr lang="fr-FR" sz="2900" dirty="0"/>
+              <a:t>). </a:t>
+            </a:r>
+          </a:p>
+          <a:p>
+            <a:pPr marL="457200" indent="-457200" algn="l">
+              <a:buFont typeface="Arial" panose="020B0604020202020204" pitchFamily="34" charset="0"/>
+              <a:buChar char="•"/>
+            </a:pPr>
+            <a:r>
+              <a:rPr lang="fr-FR" sz="2900" dirty="0" err="1"/>
+              <a:t>Remove</a:t>
+            </a:r>
+            <a:r>
+              <a:rPr lang="fr-FR" sz="2900" dirty="0"/>
+              <a:t> the </a:t>
+            </a:r>
+            <a:r>
+              <a:rPr lang="fr-FR" sz="2900" dirty="0" err="1"/>
+              <a:t>head</a:t>
+            </a:r>
+            <a:r>
+              <a:rPr lang="fr-FR" sz="2900" dirty="0"/>
+              <a:t> and replace </a:t>
+            </a:r>
+            <a:r>
+              <a:rPr lang="fr-FR" sz="2900" dirty="0" err="1"/>
+              <a:t>it</a:t>
+            </a:r>
+            <a:r>
+              <a:rPr lang="fr-FR" sz="2900" dirty="0"/>
+              <a:t> </a:t>
+            </a:r>
+            <a:r>
+              <a:rPr lang="fr-FR" sz="2900" dirty="0" err="1"/>
+              <a:t>with</a:t>
+            </a:r>
+            <a:r>
+              <a:rPr lang="fr-FR" sz="2900" dirty="0"/>
+              <a:t> classification </a:t>
+            </a:r>
+            <a:r>
+              <a:rPr lang="fr-FR" sz="2900" dirty="0" err="1"/>
+              <a:t>head</a:t>
+            </a:r>
+            <a:r>
+              <a:rPr lang="fr-FR" sz="2900" dirty="0"/>
+              <a:t>, and train for classification </a:t>
+            </a:r>
+            <a:r>
+              <a:rPr lang="fr-FR" sz="2900" dirty="0" err="1"/>
+              <a:t>task</a:t>
+            </a:r>
+            <a:r>
+              <a:rPr lang="fr-FR" sz="2900" dirty="0"/>
+              <a:t>. </a:t>
+            </a:r>
+          </a:p>
+          <a:p>
+            <a:pPr marL="457200" indent="-457200" algn="l">
+              <a:buFont typeface="Arial" panose="020B0604020202020204" pitchFamily="34" charset="0"/>
+              <a:buChar char="•"/>
+            </a:pPr>
             <a:endParaRPr lang="en-US" sz="2900" dirty="0">
               <a:solidFill>
                 <a:srgbClr val="FF6600"/>
@@ -5816,7 +6457,7 @@
     </p:spTree>
     <p:extLst>
       <p:ext uri="{BB962C8B-B14F-4D97-AF65-F5344CB8AC3E}">
-        <p14:creationId xmlns:p14="http://schemas.microsoft.com/office/powerpoint/2010/main" val="2113172012"/>
+        <p14:creationId xmlns:p14="http://schemas.microsoft.com/office/powerpoint/2010/main" val="1033785101"/>
       </p:ext>
     </p:extLst>
   </p:cSld>

</xml_diff>